<commit_message>
Upload updated Becoming a CNA pptx
Upload updated Becoming a CNA pptx with new logo/copyright
</commit_message>
<xml_diff>
--- a/docs/cna/Becoming a CNA.pptx
+++ b/docs/cna/Becoming a CNA.pptx
@@ -191,24 +191,6 @@
 </p:cmAuthorLst>
 </file>
 
-<file path=ppt/revisionInfo.xml><?xml version="1.0" encoding="utf-8"?>
-<p1510:revInfo xmlns:a="http://schemas.openxmlformats.org/drawingml/2006/main" xmlns:r="http://schemas.openxmlformats.org/officeDocument/2006/relationships" xmlns:p1510="http://schemas.microsoft.com/office/powerpoint/2015/10/main"/>
-</file>
-
-<file path=ppt/comments/comment1.xml><?xml version="1.0" encoding="utf-8"?>
-<p:cmLst xmlns:a="http://schemas.openxmlformats.org/drawingml/2006/main" xmlns:r="http://schemas.openxmlformats.org/officeDocument/2006/relationships" xmlns:p="http://schemas.openxmlformats.org/presentationml/2006/main">
-  <p:cm authorId="1" dt="2017-12-15T09:42:07.255" idx="12">
-    <p:pos x="3281" y="2993"/>
-    <p:text>The CNA rules are established in this training document? Or is there a formal set of CNA rules (CNA Processes, maybe?) that we should reference here instead?</p:text>
-    <p:extLst>
-      <p:ext uri="{C676402C-5697-4E1C-873F-D02D1690AC5C}">
-        <p15:threadingInfo xmlns:p15="http://schemas.microsoft.com/office/powerpoint/2012/main" timeZoneBias="300"/>
-      </p:ext>
-    </p:extLst>
-  </p:cm>
-</p:cmLst>
-</file>
-
 <file path=ppt/notesMasters/notesMaster1.xml><?xml version="1.0" encoding="utf-8"?>
 <p:notesMaster xmlns:a="http://schemas.openxmlformats.org/drawingml/2006/main" xmlns:r="http://schemas.openxmlformats.org/officeDocument/2006/relationships" xmlns:p="http://schemas.openxmlformats.org/presentationml/2006/main">
   <p:cSld>
@@ -291,7 +273,7 @@
           <a:p>
             <a:fld id="{C48A5AB8-C75E-4242-AC76-9DAE875A82E7}" type="datetimeFigureOut">
               <a:rPr lang="en-US" smtClean="0"/>
-              <a:t>3/7/2018</a:t>
+              <a:t>1/31/2019</a:t>
             </a:fld>
             <a:endParaRPr lang="en-US"/>
           </a:p>
@@ -850,6 +832,90 @@
 </p:notes>
 </file>
 
+<file path=ppt/notesSlides/notesSlide4.xml><?xml version="1.0" encoding="utf-8"?>
+<p:notes xmlns:a="http://schemas.openxmlformats.org/drawingml/2006/main" xmlns:r="http://schemas.openxmlformats.org/officeDocument/2006/relationships" xmlns:p="http://schemas.openxmlformats.org/presentationml/2006/main">
+  <p:cSld>
+    <p:spTree>
+      <p:nvGrpSpPr>
+        <p:cNvPr id="1" name=""/>
+        <p:cNvGrpSpPr/>
+        <p:nvPr/>
+      </p:nvGrpSpPr>
+      <p:grpSpPr>
+        <a:xfrm>
+          <a:off x="0" y="0"/>
+          <a:ext cx="0" cy="0"/>
+          <a:chOff x="0" y="0"/>
+          <a:chExt cx="0" cy="0"/>
+        </a:xfrm>
+      </p:grpSpPr>
+      <p:sp>
+        <p:nvSpPr>
+          <p:cNvPr id="2" name="Slide Image Placeholder 1"/>
+          <p:cNvSpPr>
+            <a:spLocks noGrp="1" noRot="1" noChangeAspect="1"/>
+          </p:cNvSpPr>
+          <p:nvPr>
+            <p:ph type="sldImg"/>
+          </p:nvPr>
+        </p:nvSpPr>
+        <p:spPr/>
+      </p:sp>
+      <p:sp>
+        <p:nvSpPr>
+          <p:cNvPr id="3" name="Notes Placeholder 2"/>
+          <p:cNvSpPr>
+            <a:spLocks noGrp="1"/>
+          </p:cNvSpPr>
+          <p:nvPr>
+            <p:ph type="body" idx="1"/>
+          </p:nvPr>
+        </p:nvSpPr>
+        <p:spPr/>
+        <p:txBody>
+          <a:bodyPr/>
+          <a:lstStyle/>
+          <a:p>
+            <a:endParaRPr lang="en-US" dirty="0"/>
+          </a:p>
+        </p:txBody>
+      </p:sp>
+      <p:sp>
+        <p:nvSpPr>
+          <p:cNvPr id="4" name="Slide Number Placeholder 3"/>
+          <p:cNvSpPr>
+            <a:spLocks noGrp="1"/>
+          </p:cNvSpPr>
+          <p:nvPr>
+            <p:ph type="sldNum" sz="quarter" idx="5"/>
+          </p:nvPr>
+        </p:nvSpPr>
+        <p:spPr/>
+        <p:txBody>
+          <a:bodyPr/>
+          <a:lstStyle/>
+          <a:p>
+            <a:fld id="{D26DA38A-5B6D-4B73-8631-E3ACB22184B3}" type="slidenum">
+              <a:rPr lang="en-US" smtClean="0"/>
+              <a:t>24</a:t>
+            </a:fld>
+            <a:endParaRPr lang="en-US"/>
+          </a:p>
+        </p:txBody>
+      </p:sp>
+    </p:spTree>
+    <p:extLst>
+      <p:ext uri="{BB962C8B-B14F-4D97-AF65-F5344CB8AC3E}">
+        <p14:creationId xmlns:p14="http://schemas.microsoft.com/office/powerpoint/2010/main" val="3512228826"/>
+      </p:ext>
+    </p:extLst>
+  </p:cSld>
+  <p:clrMapOvr>
+    <a:masterClrMapping/>
+  </p:clrMapOvr>
+</p:notes>
+</file>
+
 <file path=ppt/slideLayouts/slideLayout1.xml><?xml version="1.0" encoding="utf-8"?>
 <p:sldLayout xmlns:a="http://schemas.openxmlformats.org/drawingml/2006/main" xmlns:r="http://schemas.openxmlformats.org/officeDocument/2006/relationships" xmlns:p="http://schemas.openxmlformats.org/presentationml/2006/main" showMasterSp="0" preserve="1">
   <p:cSld name="Title Slide">
@@ -1107,18 +1173,60 @@
           </a:p>
         </p:txBody>
       </p:sp>
-      <p:sp>
-        <p:nvSpPr>
-          <p:cNvPr id="13" name="Text Box 34"/>
+      <p:pic>
+        <p:nvPicPr>
+          <p:cNvPr id="11" name="Picture 10">
+            <a:extLst>
+              <a:ext uri="{FF2B5EF4-FFF2-40B4-BE49-F238E27FC236}">
+                <a16:creationId xmlns:a16="http://schemas.microsoft.com/office/drawing/2014/main" id="{4431EE9E-871D-4417-AE49-F07F4743822B}"/>
+              </a:ext>
+            </a:extLst>
+          </p:cNvPr>
+          <p:cNvPicPr>
+            <a:picLocks noChangeAspect="1"/>
+          </p:cNvPicPr>
+          <p:nvPr userDrawn="1"/>
+        </p:nvPicPr>
+        <p:blipFill>
+          <a:blip r:embed="rId2">
+            <a:extLst>
+              <a:ext uri="{28A0092B-C50C-407E-A947-70E740481C1C}">
+                <a14:useLocalDpi xmlns:a14="http://schemas.microsoft.com/office/drawing/2010/main" val="0"/>
+              </a:ext>
+            </a:extLst>
+          </a:blip>
+          <a:stretch>
+            <a:fillRect/>
+          </a:stretch>
+        </p:blipFill>
+        <p:spPr>
+          <a:xfrm>
+            <a:off x="618308" y="6209056"/>
+            <a:ext cx="1177735" cy="634662"/>
+          </a:xfrm>
+          <a:prstGeom prst="rect">
+            <a:avLst/>
+          </a:prstGeom>
+        </p:spPr>
+      </p:pic>
+      <p:sp>
+        <p:nvSpPr>
+          <p:cNvPr id="17" name="Text Box 34">
+            <a:extLst>
+              <a:ext uri="{FF2B5EF4-FFF2-40B4-BE49-F238E27FC236}">
+                <a16:creationId xmlns:a16="http://schemas.microsoft.com/office/drawing/2014/main" id="{F2A17C2D-B5A6-4461-85BF-FA227916D7BC}"/>
+              </a:ext>
+            </a:extLst>
+          </p:cNvPr>
           <p:cNvSpPr txBox="1">
             <a:spLocks noChangeArrowheads="1"/>
           </p:cNvSpPr>
-          <p:nvPr/>
+          <p:nvPr userDrawn="1"/>
         </p:nvSpPr>
         <p:spPr bwMode="auto">
           <a:xfrm>
-            <a:off x="3845490" y="6256122"/>
-            <a:ext cx="5184930" cy="507831"/>
+            <a:off x="2489982" y="6353061"/>
+            <a:ext cx="6430416" cy="369332"/>
           </a:xfrm>
           <a:prstGeom prst="rect">
             <a:avLst/>
@@ -1138,111 +1246,62 @@
           </a:bodyPr>
           <a:lstStyle/>
           <a:p>
-            <a:pPr algn="r" eaLnBrk="0" hangingPunct="0">
+            <a:pPr algn="l" eaLnBrk="0" hangingPunct="0">
               <a:defRPr/>
             </a:pPr>
             <a:r>
-              <a:rPr lang="en-US" sz="900" kern="1200" baseline="0" dirty="0">
-                <a:solidFill>
-                  <a:schemeClr val="tx1"/>
-                </a:solidFill>
-                <a:latin typeface="+mn-lt"/>
-                <a:ea typeface="+mn-ea"/>
-                <a:cs typeface="+mn-cs"/>
-              </a:rPr>
+              <a:rPr lang="en-US" sz="900" dirty="0"/>
               <a:t>CVE is sponsored by </a:t>
             </a:r>
             <a:r>
-              <a:rPr lang="en-US" sz="900" kern="1200" baseline="0" dirty="0">
-                <a:solidFill>
-                  <a:schemeClr val="tx1"/>
-                </a:solidFill>
-                <a:latin typeface="+mn-lt"/>
-                <a:ea typeface="+mn-ea"/>
-                <a:cs typeface="+mn-cs"/>
-                <a:hlinkClick r:id="rId2"/>
-              </a:rPr>
-              <a:t>US-CERT</a:t>
-            </a:r>
-            <a:r>
-              <a:rPr lang="en-US" sz="900" kern="1200" baseline="0" dirty="0">
-                <a:solidFill>
-                  <a:schemeClr val="tx1"/>
-                </a:solidFill>
-                <a:latin typeface="+mn-lt"/>
-                <a:ea typeface="+mn-ea"/>
-                <a:cs typeface="+mn-cs"/>
-              </a:rPr>
-              <a:t> in the office of </a:t>
-            </a:r>
-            <a:r>
-              <a:rPr lang="en-US" sz="900" kern="1200" baseline="0" dirty="0">
-                <a:solidFill>
-                  <a:schemeClr val="tx1"/>
-                </a:solidFill>
-                <a:latin typeface="+mn-lt"/>
-                <a:ea typeface="+mn-ea"/>
-                <a:cs typeface="+mn-cs"/>
+              <a:rPr lang="en-US" sz="900" dirty="0">
                 <a:hlinkClick r:id="rId3"/>
               </a:rPr>
-              <a:t>Cybersecurity and Communications </a:t>
-            </a:r>
-            <a:r>
-              <a:rPr lang="en-US" sz="900" kern="1200" baseline="0" dirty="0">
-                <a:solidFill>
-                  <a:schemeClr val="tx1"/>
-                </a:solidFill>
-                <a:latin typeface="+mn-lt"/>
-                <a:ea typeface="+mn-ea"/>
-                <a:cs typeface="+mn-cs"/>
-              </a:rPr>
-              <a:t>at the </a:t>
-            </a:r>
-            <a:r>
-              <a:rPr lang="en-US" sz="900" kern="1200" baseline="0" dirty="0">
-                <a:solidFill>
-                  <a:schemeClr val="tx1"/>
-                </a:solidFill>
-                <a:latin typeface="+mn-lt"/>
-                <a:ea typeface="+mn-ea"/>
-                <a:cs typeface="+mn-cs"/>
+              <a:t>NSD</a:t>
+            </a:r>
+            <a:r>
+              <a:rPr lang="en-US" sz="900" dirty="0"/>
+              <a:t>, </a:t>
+            </a:r>
+            <a:r>
+              <a:rPr lang="en-US" sz="900" dirty="0">
                 <a:hlinkClick r:id="rId4"/>
               </a:rPr>
-              <a:t>U.S. Department of Homeland Security</a:t>
-            </a:r>
-            <a:r>
-              <a:rPr lang="en-US" sz="900" kern="1200" baseline="0" dirty="0">
-                <a:solidFill>
-                  <a:schemeClr val="tx1"/>
-                </a:solidFill>
-                <a:latin typeface="+mn-lt"/>
-                <a:ea typeface="+mn-ea"/>
-                <a:cs typeface="+mn-cs"/>
-              </a:rPr>
-              <a:t>. Copyright © 1999–2018, </a:t>
-            </a:r>
-            <a:r>
-              <a:rPr lang="en-US" sz="900" kern="1200" baseline="0" dirty="0">
-                <a:solidFill>
-                  <a:schemeClr val="tx1"/>
-                </a:solidFill>
-                <a:latin typeface="+mn-lt"/>
-                <a:ea typeface="+mn-ea"/>
-                <a:cs typeface="+mn-cs"/>
+              <a:t>NCCIC</a:t>
+            </a:r>
+            <a:r>
+              <a:rPr lang="en-US" sz="900" dirty="0"/>
+              <a:t> in </a:t>
+            </a:r>
+            <a:r>
+              <a:rPr lang="en-US" sz="900" dirty="0">
                 <a:hlinkClick r:id="rId5"/>
               </a:rPr>
+              <a:t>CISA</a:t>
+            </a:r>
+            <a:r>
+              <a:rPr lang="en-US" sz="900" dirty="0"/>
+              <a:t>’s Cybersecurity Division at the </a:t>
+            </a:r>
+            <a:r>
+              <a:rPr lang="en-US" sz="900" dirty="0">
+                <a:hlinkClick r:id="rId6"/>
+              </a:rPr>
+              <a:t>U.S. Department of Homeland Security</a:t>
+            </a:r>
+            <a:r>
+              <a:rPr lang="en-US" sz="900" dirty="0"/>
+              <a:t>. Copyright © 1999–2019, </a:t>
+            </a:r>
+            <a:r>
+              <a:rPr lang="en-US" sz="900" dirty="0">
+                <a:hlinkClick r:id="rId7"/>
+              </a:rPr>
               <a:t>The MITRE Corporation</a:t>
             </a:r>
             <a:r>
-              <a:rPr lang="en-US" sz="900" kern="1200" baseline="0" dirty="0">
-                <a:solidFill>
-                  <a:schemeClr val="tx1"/>
-                </a:solidFill>
-                <a:latin typeface="+mn-lt"/>
-                <a:ea typeface="+mn-ea"/>
-                <a:cs typeface="+mn-cs"/>
-              </a:rPr>
-              <a:t>. CVE and the CVE logo are registered trademarks and CVE-Compatible is a trademark of The MITRE Corporation.</a:t>
+              <a:rPr lang="en-US" sz="900" dirty="0"/>
+              <a:t>. CVE and the CVE logo are registered trademarks of The MITRE Corporation.</a:t>
             </a:r>
             <a:endParaRPr lang="en-US" altLang="en-US" sz="900" b="0" u="none" baseline="0" dirty="0">
               <a:solidFill>
@@ -1250,125 +1309,6 @@
               </a:solidFill>
               <a:cs typeface="+mn-cs"/>
             </a:endParaRPr>
-          </a:p>
-        </p:txBody>
-      </p:sp>
-      <p:pic>
-        <p:nvPicPr>
-          <p:cNvPr id="2" name="Picture 1"/>
-          <p:cNvPicPr>
-            <a:picLocks noChangeAspect="1"/>
-          </p:cNvPicPr>
-          <p:nvPr/>
-        </p:nvPicPr>
-        <p:blipFill>
-          <a:blip r:embed="rId6">
-            <a:extLst>
-              <a:ext uri="{28A0092B-C50C-407E-A947-70E740481C1C}">
-                <a14:useLocalDpi xmlns:a14="http://schemas.microsoft.com/office/drawing/2010/main" val="0"/>
-              </a:ext>
-            </a:extLst>
-          </a:blip>
-          <a:stretch>
-            <a:fillRect/>
-          </a:stretch>
-        </p:blipFill>
-        <p:spPr>
-          <a:xfrm>
-            <a:off x="524456" y="6149707"/>
-            <a:ext cx="1101840" cy="521537"/>
-          </a:xfrm>
-          <a:prstGeom prst="rect">
-            <a:avLst/>
-          </a:prstGeom>
-        </p:spPr>
-      </p:pic>
-      <p:pic>
-        <p:nvPicPr>
-          <p:cNvPr id="16" name="Picture 15"/>
-          <p:cNvPicPr>
-            <a:picLocks noChangeAspect="1"/>
-          </p:cNvPicPr>
-          <p:nvPr/>
-        </p:nvPicPr>
-        <p:blipFill>
-          <a:blip r:embed="rId6">
-            <a:extLst>
-              <a:ext uri="{28A0092B-C50C-407E-A947-70E740481C1C}">
-                <a14:useLocalDpi xmlns:a14="http://schemas.microsoft.com/office/drawing/2010/main" val="0"/>
-              </a:ext>
-            </a:extLst>
-          </a:blip>
-          <a:stretch>
-            <a:fillRect/>
-          </a:stretch>
-        </p:blipFill>
-        <p:spPr>
-          <a:xfrm>
-            <a:off x="5409764" y="280412"/>
-            <a:ext cx="1101840" cy="521537"/>
-          </a:xfrm>
-          <a:prstGeom prst="rect">
-            <a:avLst/>
-          </a:prstGeom>
-        </p:spPr>
-      </p:pic>
-      <p:sp>
-        <p:nvSpPr>
-          <p:cNvPr id="5" name="TextBox 4"/>
-          <p:cNvSpPr txBox="1"/>
-          <p:nvPr/>
-        </p:nvSpPr>
-        <p:spPr>
-          <a:xfrm>
-            <a:off x="6511605" y="187703"/>
-            <a:ext cx="2518816" cy="584775"/>
-          </a:xfrm>
-          <a:prstGeom prst="rect">
-            <a:avLst/>
-          </a:prstGeom>
-          <a:solidFill>
-            <a:schemeClr val="bg1"/>
-          </a:solidFill>
-        </p:spPr>
-        <p:txBody>
-          <a:bodyPr wrap="square" rtlCol="0">
-            <a:spAutoFit/>
-          </a:bodyPr>
-          <a:lstStyle/>
-          <a:p>
-            <a:pPr>
-              <a:spcAft>
-                <a:spcPts val="0"/>
-              </a:spcAft>
-            </a:pPr>
-            <a:r>
-              <a:rPr lang="en-US" sz="1600" b="1" baseline="0" dirty="0">
-                <a:solidFill>
-                  <a:srgbClr val="650800"/>
-                </a:solidFill>
-                <a:ea typeface="Verdana" pitchFamily="34" charset="0"/>
-                <a:cs typeface="Verdana" pitchFamily="34" charset="0"/>
-              </a:rPr>
-              <a:t>Common Vulnerabilities </a:t>
-            </a:r>
-          </a:p>
-          <a:p>
-            <a:pPr>
-              <a:spcAft>
-                <a:spcPts val="0"/>
-              </a:spcAft>
-            </a:pPr>
-            <a:r>
-              <a:rPr lang="en-US" sz="1600" b="1" baseline="0" dirty="0">
-                <a:solidFill>
-                  <a:srgbClr val="650800"/>
-                </a:solidFill>
-                <a:ea typeface="Verdana" pitchFamily="34" charset="0"/>
-                <a:cs typeface="Verdana" pitchFamily="34" charset="0"/>
-              </a:rPr>
-              <a:t>and Exposures</a:t>
-            </a:r>
           </a:p>
         </p:txBody>
       </p:sp>
@@ -3368,11 +3308,17 @@
       </p:sp>
       <p:pic>
         <p:nvPicPr>
-          <p:cNvPr id="11" name="Picture 10"/>
+          <p:cNvPr id="12" name="Picture 11">
+            <a:extLst>
+              <a:ext uri="{FF2B5EF4-FFF2-40B4-BE49-F238E27FC236}">
+                <a16:creationId xmlns:a16="http://schemas.microsoft.com/office/drawing/2014/main" id="{3C326E03-BC68-47FB-AFD1-1389FB5095E5}"/>
+              </a:ext>
+            </a:extLst>
+          </p:cNvPr>
           <p:cNvPicPr>
             <a:picLocks noChangeAspect="1"/>
           </p:cNvPicPr>
-          <p:nvPr/>
+          <p:nvPr userDrawn="1"/>
         </p:nvPicPr>
         <p:blipFill>
           <a:blip r:embed="rId2">
@@ -3388,8 +3334,8 @@
         </p:blipFill>
         <p:spPr>
           <a:xfrm>
-            <a:off x="535564" y="6298118"/>
-            <a:ext cx="904929" cy="428333"/>
+            <a:off x="618308" y="6209056"/>
+            <a:ext cx="1177735" cy="634662"/>
           </a:xfrm>
           <a:prstGeom prst="rect">
             <a:avLst/>
@@ -3398,16 +3344,22 @@
       </p:pic>
       <p:sp>
         <p:nvSpPr>
-          <p:cNvPr id="15" name="Text Box 34"/>
+          <p:cNvPr id="20" name="Text Box 34">
+            <a:extLst>
+              <a:ext uri="{FF2B5EF4-FFF2-40B4-BE49-F238E27FC236}">
+                <a16:creationId xmlns:a16="http://schemas.microsoft.com/office/drawing/2014/main" id="{C6639DB9-BE71-402F-A80D-1F2B8A487CCE}"/>
+              </a:ext>
+            </a:extLst>
+          </p:cNvPr>
           <p:cNvSpPr txBox="1">
             <a:spLocks noChangeArrowheads="1"/>
           </p:cNvSpPr>
-          <p:nvPr/>
+          <p:nvPr userDrawn="1"/>
         </p:nvSpPr>
         <p:spPr bwMode="auto">
           <a:xfrm>
-            <a:off x="3845490" y="6256122"/>
-            <a:ext cx="5184930" cy="507831"/>
+            <a:off x="2489982" y="6353061"/>
+            <a:ext cx="6430416" cy="369332"/>
           </a:xfrm>
           <a:prstGeom prst="rect">
             <a:avLst/>
@@ -3427,111 +3379,62 @@
           </a:bodyPr>
           <a:lstStyle/>
           <a:p>
-            <a:pPr algn="r" eaLnBrk="0" hangingPunct="0">
+            <a:pPr algn="l" eaLnBrk="0" hangingPunct="0">
               <a:defRPr/>
             </a:pPr>
             <a:r>
-              <a:rPr lang="en-US" sz="900" kern="1200" baseline="0" dirty="0">
-                <a:solidFill>
-                  <a:schemeClr val="tx1"/>
-                </a:solidFill>
-                <a:latin typeface="+mn-lt"/>
-                <a:ea typeface="+mn-ea"/>
-                <a:cs typeface="+mn-cs"/>
-              </a:rPr>
+              <a:rPr lang="en-US" sz="900" dirty="0"/>
               <a:t>CVE is sponsored by </a:t>
             </a:r>
             <a:r>
-              <a:rPr lang="en-US" sz="900" kern="1200" baseline="0" dirty="0">
-                <a:solidFill>
-                  <a:schemeClr val="tx1"/>
-                </a:solidFill>
-                <a:latin typeface="+mn-lt"/>
-                <a:ea typeface="+mn-ea"/>
-                <a:cs typeface="+mn-cs"/>
+              <a:rPr lang="en-US" sz="900" dirty="0">
                 <a:hlinkClick r:id="rId3"/>
               </a:rPr>
-              <a:t>US-CERT</a:t>
-            </a:r>
-            <a:r>
-              <a:rPr lang="en-US" sz="900" kern="1200" baseline="0" dirty="0">
-                <a:solidFill>
-                  <a:schemeClr val="tx1"/>
-                </a:solidFill>
-                <a:latin typeface="+mn-lt"/>
-                <a:ea typeface="+mn-ea"/>
-                <a:cs typeface="+mn-cs"/>
-              </a:rPr>
-              <a:t> in the office of </a:t>
-            </a:r>
-            <a:r>
-              <a:rPr lang="en-US" sz="900" kern="1200" baseline="0" dirty="0">
-                <a:solidFill>
-                  <a:schemeClr val="tx1"/>
-                </a:solidFill>
-                <a:latin typeface="+mn-lt"/>
-                <a:ea typeface="+mn-ea"/>
-                <a:cs typeface="+mn-cs"/>
+              <a:t>NSD</a:t>
+            </a:r>
+            <a:r>
+              <a:rPr lang="en-US" sz="900" dirty="0"/>
+              <a:t>, </a:t>
+            </a:r>
+            <a:r>
+              <a:rPr lang="en-US" sz="900" dirty="0">
                 <a:hlinkClick r:id="rId4"/>
               </a:rPr>
-              <a:t>Cybersecurity and Communications </a:t>
-            </a:r>
-            <a:r>
-              <a:rPr lang="en-US" sz="900" kern="1200" baseline="0" dirty="0">
-                <a:solidFill>
-                  <a:schemeClr val="tx1"/>
-                </a:solidFill>
-                <a:latin typeface="+mn-lt"/>
-                <a:ea typeface="+mn-ea"/>
-                <a:cs typeface="+mn-cs"/>
-              </a:rPr>
-              <a:t>at the </a:t>
-            </a:r>
-            <a:r>
-              <a:rPr lang="en-US" sz="900" kern="1200" baseline="0" dirty="0">
-                <a:solidFill>
-                  <a:schemeClr val="tx1"/>
-                </a:solidFill>
-                <a:latin typeface="+mn-lt"/>
-                <a:ea typeface="+mn-ea"/>
-                <a:cs typeface="+mn-cs"/>
+              <a:t>NCCIC</a:t>
+            </a:r>
+            <a:r>
+              <a:rPr lang="en-US" sz="900" dirty="0"/>
+              <a:t> in </a:t>
+            </a:r>
+            <a:r>
+              <a:rPr lang="en-US" sz="900" dirty="0">
                 <a:hlinkClick r:id="rId5"/>
               </a:rPr>
-              <a:t>U.S. Department of Homeland Security</a:t>
-            </a:r>
-            <a:r>
-              <a:rPr lang="en-US" sz="900" kern="1200" baseline="0" dirty="0">
-                <a:solidFill>
-                  <a:schemeClr val="tx1"/>
-                </a:solidFill>
-                <a:latin typeface="+mn-lt"/>
-                <a:ea typeface="+mn-ea"/>
-                <a:cs typeface="+mn-cs"/>
-              </a:rPr>
-              <a:t>. Copyright © 1999–2018, </a:t>
-            </a:r>
-            <a:r>
-              <a:rPr lang="en-US" sz="900" kern="1200" baseline="0" dirty="0">
-                <a:solidFill>
-                  <a:schemeClr val="tx1"/>
-                </a:solidFill>
-                <a:latin typeface="+mn-lt"/>
-                <a:ea typeface="+mn-ea"/>
-                <a:cs typeface="+mn-cs"/>
+              <a:t>CISA</a:t>
+            </a:r>
+            <a:r>
+              <a:rPr lang="en-US" sz="900" dirty="0"/>
+              <a:t>’s Cybersecurity Division at the </a:t>
+            </a:r>
+            <a:r>
+              <a:rPr lang="en-US" sz="900" dirty="0">
                 <a:hlinkClick r:id="rId6"/>
               </a:rPr>
+              <a:t>U.S. Department of Homeland Security</a:t>
+            </a:r>
+            <a:r>
+              <a:rPr lang="en-US" sz="900" dirty="0"/>
+              <a:t>. Copyright © 1999–2019, </a:t>
+            </a:r>
+            <a:r>
+              <a:rPr lang="en-US" sz="900" dirty="0">
+                <a:hlinkClick r:id="rId7"/>
+              </a:rPr>
               <a:t>The MITRE Corporation</a:t>
             </a:r>
             <a:r>
-              <a:rPr lang="en-US" sz="900" kern="1200" baseline="0" dirty="0">
-                <a:solidFill>
-                  <a:schemeClr val="tx1"/>
-                </a:solidFill>
-                <a:latin typeface="+mn-lt"/>
-                <a:ea typeface="+mn-ea"/>
-                <a:cs typeface="+mn-cs"/>
-              </a:rPr>
-              <a:t>. CVE and the CVE logo are registered trademarks and CVE-Compatible is a trademark of The MITRE Corporation.</a:t>
+              <a:rPr lang="en-US" sz="900" dirty="0"/>
+              <a:t>. CVE and the CVE logo are registered trademarks of The MITRE Corporation.</a:t>
             </a:r>
             <a:endParaRPr lang="en-US" altLang="en-US" sz="900" b="0" u="none" baseline="0" dirty="0">
               <a:solidFill>
@@ -3539,95 +3442,6 @@
               </a:solidFill>
               <a:cs typeface="+mn-cs"/>
             </a:endParaRPr>
-          </a:p>
-        </p:txBody>
-      </p:sp>
-      <p:pic>
-        <p:nvPicPr>
-          <p:cNvPr id="16" name="Picture 15"/>
-          <p:cNvPicPr>
-            <a:picLocks noChangeAspect="1"/>
-          </p:cNvPicPr>
-          <p:nvPr/>
-        </p:nvPicPr>
-        <p:blipFill>
-          <a:blip r:embed="rId2">
-            <a:extLst>
-              <a:ext uri="{28A0092B-C50C-407E-A947-70E740481C1C}">
-                <a14:useLocalDpi xmlns:a14="http://schemas.microsoft.com/office/drawing/2010/main" val="0"/>
-              </a:ext>
-            </a:extLst>
-          </a:blip>
-          <a:stretch>
-            <a:fillRect/>
-          </a:stretch>
-        </p:blipFill>
-        <p:spPr>
-          <a:xfrm>
-            <a:off x="5409764" y="267886"/>
-            <a:ext cx="1101840" cy="521537"/>
-          </a:xfrm>
-          <a:prstGeom prst="rect">
-            <a:avLst/>
-          </a:prstGeom>
-        </p:spPr>
-      </p:pic>
-      <p:sp>
-        <p:nvSpPr>
-          <p:cNvPr id="19" name="TextBox 18"/>
-          <p:cNvSpPr txBox="1"/>
-          <p:nvPr/>
-        </p:nvSpPr>
-        <p:spPr>
-          <a:xfrm>
-            <a:off x="6511605" y="175177"/>
-            <a:ext cx="2518816" cy="584775"/>
-          </a:xfrm>
-          <a:prstGeom prst="rect">
-            <a:avLst/>
-          </a:prstGeom>
-          <a:solidFill>
-            <a:schemeClr val="bg1"/>
-          </a:solidFill>
-        </p:spPr>
-        <p:txBody>
-          <a:bodyPr wrap="square" rtlCol="0">
-            <a:spAutoFit/>
-          </a:bodyPr>
-          <a:lstStyle/>
-          <a:p>
-            <a:pPr>
-              <a:spcAft>
-                <a:spcPts val="0"/>
-              </a:spcAft>
-            </a:pPr>
-            <a:r>
-              <a:rPr lang="en-US" sz="1600" b="1" baseline="0" dirty="0">
-                <a:solidFill>
-                  <a:srgbClr val="650800"/>
-                </a:solidFill>
-                <a:ea typeface="Verdana" pitchFamily="34" charset="0"/>
-                <a:cs typeface="Verdana" pitchFamily="34" charset="0"/>
-              </a:rPr>
-              <a:t>Common Vulnerabilities </a:t>
-            </a:r>
-          </a:p>
-          <a:p>
-            <a:pPr>
-              <a:spcAft>
-                <a:spcPts val="0"/>
-              </a:spcAft>
-            </a:pPr>
-            <a:r>
-              <a:rPr lang="en-US" sz="1600" b="1" baseline="0" dirty="0">
-                <a:solidFill>
-                  <a:srgbClr val="650800"/>
-                </a:solidFill>
-                <a:ea typeface="Verdana" pitchFamily="34" charset="0"/>
-                <a:cs typeface="Verdana" pitchFamily="34" charset="0"/>
-              </a:rPr>
-              <a:t>and Exposures</a:t>
-            </a:r>
           </a:p>
         </p:txBody>
       </p:sp>
@@ -4971,76 +4785,19 @@
           </a:p>
         </p:txBody>
       </p:sp>
-      <p:sp>
-        <p:nvSpPr>
-          <p:cNvPr id="16" name="Text Box 34"/>
-          <p:cNvSpPr txBox="1">
-            <a:spLocks noChangeArrowheads="1"/>
-          </p:cNvSpPr>
-          <p:nvPr/>
-        </p:nvSpPr>
-        <p:spPr bwMode="auto">
-          <a:xfrm>
-            <a:off x="5348546" y="6440782"/>
-            <a:ext cx="3525723" cy="307777"/>
-          </a:xfrm>
-          <a:prstGeom prst="rect">
-            <a:avLst/>
-          </a:prstGeom>
-          <a:noFill/>
-          <a:ln w="9525">
-            <a:noFill/>
-            <a:miter lim="800000"/>
-            <a:headEnd/>
-            <a:tailEnd/>
-          </a:ln>
-          <a:effectLst/>
-        </p:spPr>
-        <p:txBody>
-          <a:bodyPr wrap="square" lIns="45720" rIns="45720">
-            <a:spAutoFit/>
-          </a:bodyPr>
-          <a:lstStyle/>
-          <a:p>
-            <a:pPr algn="r" eaLnBrk="0" hangingPunct="0">
-              <a:defRPr/>
-            </a:pPr>
-            <a:r>
-              <a:rPr lang="en-US" altLang="en-US" sz="700" b="0" dirty="0">
-                <a:cs typeface="+mn-cs"/>
-              </a:rPr>
-              <a:t>HSSEDI is a trademark of the U.S. Department of Homeland Security (DHS).</a:t>
-            </a:r>
-          </a:p>
-          <a:p>
-            <a:pPr algn="r" eaLnBrk="0" hangingPunct="0">
-              <a:defRPr/>
-            </a:pPr>
-            <a:r>
-              <a:rPr lang="en-US" altLang="en-US" sz="700" b="0" dirty="0">
-                <a:cs typeface="+mn-cs"/>
-              </a:rPr>
-              <a:t>The HSSEDI FFRDC is managed and operated by The MITRE</a:t>
-            </a:r>
-            <a:r>
-              <a:rPr lang="en-US" altLang="en-US" sz="700" b="0" baseline="0" dirty="0">
-                <a:cs typeface="+mn-cs"/>
-              </a:rPr>
-              <a:t> Corporation for DHS.</a:t>
-            </a:r>
-            <a:endParaRPr lang="en-US" altLang="en-US" sz="700" b="0" dirty="0">
-              <a:cs typeface="+mn-cs"/>
-            </a:endParaRPr>
-          </a:p>
-        </p:txBody>
-      </p:sp>
       <p:pic>
         <p:nvPicPr>
-          <p:cNvPr id="11" name="Picture 10"/>
+          <p:cNvPr id="12" name="Picture 11">
+            <a:extLst>
+              <a:ext uri="{FF2B5EF4-FFF2-40B4-BE49-F238E27FC236}">
+                <a16:creationId xmlns:a16="http://schemas.microsoft.com/office/drawing/2014/main" id="{07394CE1-E2AB-4A29-B42E-038DE498B386}"/>
+              </a:ext>
+            </a:extLst>
+          </p:cNvPr>
           <p:cNvPicPr>
             <a:picLocks noChangeAspect="1"/>
           </p:cNvPicPr>
-          <p:nvPr/>
+          <p:nvPr userDrawn="1"/>
         </p:nvPicPr>
         <p:blipFill>
           <a:blip r:embed="rId2">
@@ -5056,44 +4813,117 @@
         </p:blipFill>
         <p:spPr>
           <a:xfrm>
-            <a:off x="535564" y="6298118"/>
-            <a:ext cx="904929" cy="428333"/>
+            <a:off x="618308" y="6209056"/>
+            <a:ext cx="1177735" cy="634662"/>
           </a:xfrm>
           <a:prstGeom prst="rect">
             <a:avLst/>
           </a:prstGeom>
         </p:spPr>
       </p:pic>
-      <p:pic>
-        <p:nvPicPr>
-          <p:cNvPr id="17" name="Picture 16"/>
-          <p:cNvPicPr>
-            <a:picLocks noChangeAspect="1"/>
-          </p:cNvPicPr>
-          <p:nvPr/>
-        </p:nvPicPr>
-        <p:blipFill>
-          <a:blip r:embed="rId2">
+      <p:sp>
+        <p:nvSpPr>
+          <p:cNvPr id="15" name="Text Box 34">
             <a:extLst>
-              <a:ext uri="{28A0092B-C50C-407E-A947-70E740481C1C}">
-                <a14:useLocalDpi xmlns:a14="http://schemas.microsoft.com/office/drawing/2010/main" val="0"/>
+              <a:ext uri="{FF2B5EF4-FFF2-40B4-BE49-F238E27FC236}">
+                <a16:creationId xmlns:a16="http://schemas.microsoft.com/office/drawing/2014/main" id="{B7A11BEE-A997-469D-B76F-5952F59A1300}"/>
               </a:ext>
             </a:extLst>
-          </a:blip>
-          <a:stretch>
-            <a:fillRect/>
-          </a:stretch>
-        </p:blipFill>
-        <p:spPr>
+          </p:cNvPr>
+          <p:cNvSpPr txBox="1">
+            <a:spLocks noChangeArrowheads="1"/>
+          </p:cNvSpPr>
+          <p:nvPr userDrawn="1"/>
+        </p:nvSpPr>
+        <p:spPr bwMode="auto">
           <a:xfrm>
-            <a:off x="7737360" y="523844"/>
-            <a:ext cx="1101840" cy="521537"/>
+            <a:off x="2489982" y="6353061"/>
+            <a:ext cx="6430416" cy="369332"/>
           </a:xfrm>
           <a:prstGeom prst="rect">
             <a:avLst/>
           </a:prstGeom>
+          <a:noFill/>
+          <a:ln w="9525">
+            <a:noFill/>
+            <a:miter lim="800000"/>
+            <a:headEnd/>
+            <a:tailEnd/>
+          </a:ln>
+          <a:effectLst/>
         </p:spPr>
-      </p:pic>
+        <p:txBody>
+          <a:bodyPr wrap="square" lIns="45720" rIns="45720">
+            <a:spAutoFit/>
+          </a:bodyPr>
+          <a:lstStyle/>
+          <a:p>
+            <a:pPr algn="l" eaLnBrk="0" hangingPunct="0">
+              <a:defRPr/>
+            </a:pPr>
+            <a:r>
+              <a:rPr lang="en-US" sz="900" dirty="0"/>
+              <a:t>CVE is sponsored by </a:t>
+            </a:r>
+            <a:r>
+              <a:rPr lang="en-US" sz="900" dirty="0">
+                <a:hlinkClick r:id="rId3"/>
+              </a:rPr>
+              <a:t>NSD</a:t>
+            </a:r>
+            <a:r>
+              <a:rPr lang="en-US" sz="900" dirty="0"/>
+              <a:t>, </a:t>
+            </a:r>
+            <a:r>
+              <a:rPr lang="en-US" sz="900" dirty="0">
+                <a:hlinkClick r:id="rId4"/>
+              </a:rPr>
+              <a:t>NCCIC</a:t>
+            </a:r>
+            <a:r>
+              <a:rPr lang="en-US" sz="900" dirty="0"/>
+              <a:t> in </a:t>
+            </a:r>
+            <a:r>
+              <a:rPr lang="en-US" sz="900" dirty="0">
+                <a:hlinkClick r:id="rId5"/>
+              </a:rPr>
+              <a:t>CISA</a:t>
+            </a:r>
+            <a:r>
+              <a:rPr lang="en-US" sz="900" dirty="0"/>
+              <a:t>’s Cybersecurity Division at the </a:t>
+            </a:r>
+            <a:r>
+              <a:rPr lang="en-US" sz="900" dirty="0">
+                <a:hlinkClick r:id="rId6"/>
+              </a:rPr>
+              <a:t>U.S. Department of Homeland Security</a:t>
+            </a:r>
+            <a:r>
+              <a:rPr lang="en-US" sz="900" dirty="0"/>
+              <a:t>. Copyright © 1999–2019, </a:t>
+            </a:r>
+            <a:r>
+              <a:rPr lang="en-US" sz="900" dirty="0">
+                <a:hlinkClick r:id="rId7"/>
+              </a:rPr>
+              <a:t>The MITRE Corporation</a:t>
+            </a:r>
+            <a:r>
+              <a:rPr lang="en-US" sz="900" dirty="0"/>
+              <a:t>. CVE and the CVE logo are registered trademarks of The MITRE Corporation.</a:t>
+            </a:r>
+            <a:endParaRPr lang="en-US" altLang="en-US" sz="900" b="0" u="none" baseline="0" dirty="0">
+              <a:solidFill>
+                <a:schemeClr val="tx1"/>
+              </a:solidFill>
+              <a:cs typeface="+mn-cs"/>
+            </a:endParaRPr>
+          </a:p>
+        </p:txBody>
+      </p:sp>
     </p:spTree>
     <p:extLst>
       <p:ext uri="{BB962C8B-B14F-4D97-AF65-F5344CB8AC3E}">
@@ -5446,11 +5276,17 @@
       </p:sp>
       <p:pic>
         <p:nvPicPr>
-          <p:cNvPr id="14" name="Picture 13"/>
+          <p:cNvPr id="17" name="Picture 16">
+            <a:extLst>
+              <a:ext uri="{FF2B5EF4-FFF2-40B4-BE49-F238E27FC236}">
+                <a16:creationId xmlns:a16="http://schemas.microsoft.com/office/drawing/2014/main" id="{56EF5739-884D-4290-84F5-80B14D711888}"/>
+              </a:ext>
+            </a:extLst>
+          </p:cNvPr>
           <p:cNvPicPr>
             <a:picLocks noChangeAspect="1"/>
           </p:cNvPicPr>
-          <p:nvPr/>
+          <p:nvPr userDrawn="1"/>
         </p:nvPicPr>
         <p:blipFill>
           <a:blip r:embed="rId11">
@@ -5466,56 +5302,32 @@
         </p:blipFill>
         <p:spPr>
           <a:xfrm>
-            <a:off x="7737360" y="523844"/>
-            <a:ext cx="1101840" cy="521537"/>
+            <a:off x="618308" y="6209056"/>
+            <a:ext cx="1177735" cy="634662"/>
           </a:xfrm>
           <a:prstGeom prst="rect">
             <a:avLst/>
           </a:prstGeom>
         </p:spPr>
       </p:pic>
-      <p:pic>
-        <p:nvPicPr>
-          <p:cNvPr id="16" name="Picture 15"/>
-          <p:cNvPicPr>
-            <a:picLocks noChangeAspect="1"/>
-          </p:cNvPicPr>
-          <p:nvPr/>
-        </p:nvPicPr>
-        <p:blipFill>
-          <a:blip r:embed="rId11">
+      <p:sp>
+        <p:nvSpPr>
+          <p:cNvPr id="18" name="Text Box 34">
             <a:extLst>
-              <a:ext uri="{28A0092B-C50C-407E-A947-70E740481C1C}">
-                <a14:useLocalDpi xmlns:a14="http://schemas.microsoft.com/office/drawing/2010/main" val="0"/>
+              <a:ext uri="{FF2B5EF4-FFF2-40B4-BE49-F238E27FC236}">
+                <a16:creationId xmlns:a16="http://schemas.microsoft.com/office/drawing/2014/main" id="{9C6BB7A0-3841-49D6-B199-AAA133423694}"/>
               </a:ext>
             </a:extLst>
-          </a:blip>
-          <a:stretch>
-            <a:fillRect/>
-          </a:stretch>
-        </p:blipFill>
-        <p:spPr>
-          <a:xfrm>
-            <a:off x="535564" y="6298118"/>
-            <a:ext cx="904929" cy="428333"/>
-          </a:xfrm>
-          <a:prstGeom prst="rect">
-            <a:avLst/>
-          </a:prstGeom>
-        </p:spPr>
-      </p:pic>
-      <p:sp>
-        <p:nvSpPr>
-          <p:cNvPr id="19" name="Text Box 34"/>
+          </p:cNvPr>
           <p:cNvSpPr txBox="1">
             <a:spLocks noChangeArrowheads="1"/>
           </p:cNvSpPr>
-          <p:nvPr/>
+          <p:nvPr userDrawn="1"/>
         </p:nvSpPr>
         <p:spPr bwMode="auto">
           <a:xfrm>
-            <a:off x="3845490" y="6256122"/>
-            <a:ext cx="5184930" cy="507831"/>
+            <a:off x="2489982" y="6353061"/>
+            <a:ext cx="6430416" cy="369332"/>
           </a:xfrm>
           <a:prstGeom prst="rect">
             <a:avLst/>
@@ -5535,111 +5347,62 @@
           </a:bodyPr>
           <a:lstStyle/>
           <a:p>
-            <a:pPr algn="r" eaLnBrk="0" hangingPunct="0">
+            <a:pPr algn="l" eaLnBrk="0" hangingPunct="0">
               <a:defRPr/>
             </a:pPr>
             <a:r>
-              <a:rPr lang="en-US" sz="900" kern="1200" baseline="0" dirty="0">
-                <a:solidFill>
-                  <a:schemeClr val="tx1"/>
-                </a:solidFill>
-                <a:latin typeface="+mn-lt"/>
-                <a:ea typeface="+mn-ea"/>
-                <a:cs typeface="+mn-cs"/>
-              </a:rPr>
+              <a:rPr lang="en-US" sz="900" dirty="0"/>
               <a:t>CVE is sponsored by </a:t>
             </a:r>
             <a:r>
-              <a:rPr lang="en-US" sz="900" kern="1200" baseline="0" dirty="0">
-                <a:solidFill>
-                  <a:schemeClr val="tx1"/>
-                </a:solidFill>
-                <a:latin typeface="+mn-lt"/>
-                <a:ea typeface="+mn-ea"/>
-                <a:cs typeface="+mn-cs"/>
+              <a:rPr lang="en-US" sz="900" dirty="0">
                 <a:hlinkClick r:id="rId12"/>
               </a:rPr>
-              <a:t>US-CERT</a:t>
-            </a:r>
-            <a:r>
-              <a:rPr lang="en-US" sz="900" kern="1200" baseline="0" dirty="0">
-                <a:solidFill>
-                  <a:schemeClr val="tx1"/>
-                </a:solidFill>
-                <a:latin typeface="+mn-lt"/>
-                <a:ea typeface="+mn-ea"/>
-                <a:cs typeface="+mn-cs"/>
-              </a:rPr>
-              <a:t> in the office of </a:t>
-            </a:r>
-            <a:r>
-              <a:rPr lang="en-US" sz="900" kern="1200" baseline="0" dirty="0">
-                <a:solidFill>
-                  <a:schemeClr val="tx1"/>
-                </a:solidFill>
-                <a:latin typeface="+mn-lt"/>
-                <a:ea typeface="+mn-ea"/>
-                <a:cs typeface="+mn-cs"/>
+              <a:t>NSD</a:t>
+            </a:r>
+            <a:r>
+              <a:rPr lang="en-US" sz="900" dirty="0"/>
+              <a:t>, </a:t>
+            </a:r>
+            <a:r>
+              <a:rPr lang="en-US" sz="900" dirty="0">
                 <a:hlinkClick r:id="rId13"/>
               </a:rPr>
-              <a:t>Cybersecurity and Communications </a:t>
-            </a:r>
-            <a:r>
-              <a:rPr lang="en-US" sz="900" kern="1200" baseline="0" dirty="0">
-                <a:solidFill>
-                  <a:schemeClr val="tx1"/>
-                </a:solidFill>
-                <a:latin typeface="+mn-lt"/>
-                <a:ea typeface="+mn-ea"/>
-                <a:cs typeface="+mn-cs"/>
-              </a:rPr>
-              <a:t>at the </a:t>
-            </a:r>
-            <a:r>
-              <a:rPr lang="en-US" sz="900" kern="1200" baseline="0" dirty="0">
-                <a:solidFill>
-                  <a:schemeClr val="tx1"/>
-                </a:solidFill>
-                <a:latin typeface="+mn-lt"/>
-                <a:ea typeface="+mn-ea"/>
-                <a:cs typeface="+mn-cs"/>
+              <a:t>NCCIC</a:t>
+            </a:r>
+            <a:r>
+              <a:rPr lang="en-US" sz="900" dirty="0"/>
+              <a:t> in </a:t>
+            </a:r>
+            <a:r>
+              <a:rPr lang="en-US" sz="900" dirty="0">
                 <a:hlinkClick r:id="rId14"/>
               </a:rPr>
-              <a:t>U.S. Department of Homeland Security</a:t>
-            </a:r>
-            <a:r>
-              <a:rPr lang="en-US" sz="900" kern="1200" baseline="0" dirty="0">
-                <a:solidFill>
-                  <a:schemeClr val="tx1"/>
-                </a:solidFill>
-                <a:latin typeface="+mn-lt"/>
-                <a:ea typeface="+mn-ea"/>
-                <a:cs typeface="+mn-cs"/>
-              </a:rPr>
-              <a:t>. Copyright © 1999–2018, </a:t>
-            </a:r>
-            <a:r>
-              <a:rPr lang="en-US" sz="900" kern="1200" baseline="0" dirty="0">
-                <a:solidFill>
-                  <a:schemeClr val="tx1"/>
-                </a:solidFill>
-                <a:latin typeface="+mn-lt"/>
-                <a:ea typeface="+mn-ea"/>
-                <a:cs typeface="+mn-cs"/>
+              <a:t>CISA</a:t>
+            </a:r>
+            <a:r>
+              <a:rPr lang="en-US" sz="900" dirty="0"/>
+              <a:t>’s Cybersecurity Division at the </a:t>
+            </a:r>
+            <a:r>
+              <a:rPr lang="en-US" sz="900" dirty="0">
                 <a:hlinkClick r:id="rId15"/>
               </a:rPr>
+              <a:t>U.S. Department of Homeland Security</a:t>
+            </a:r>
+            <a:r>
+              <a:rPr lang="en-US" sz="900" dirty="0"/>
+              <a:t>. Copyright © 1999–2019, </a:t>
+            </a:r>
+            <a:r>
+              <a:rPr lang="en-US" sz="900" dirty="0">
+                <a:hlinkClick r:id="rId16"/>
+              </a:rPr>
               <a:t>The MITRE Corporation</a:t>
             </a:r>
             <a:r>
-              <a:rPr lang="en-US" sz="900" kern="1200" baseline="0" dirty="0">
-                <a:solidFill>
-                  <a:schemeClr val="tx1"/>
-                </a:solidFill>
-                <a:latin typeface="+mn-lt"/>
-                <a:ea typeface="+mn-ea"/>
-                <a:cs typeface="+mn-cs"/>
-              </a:rPr>
-              <a:t>. CVE and the CVE logo are registered trademarks and CVE-Compatible is a trademark of The MITRE Corporation.</a:t>
+              <a:rPr lang="en-US" sz="900" dirty="0"/>
+              <a:t>. CVE and the CVE logo are registered trademarks of The MITRE Corporation.</a:t>
             </a:r>
             <a:endParaRPr lang="en-US" altLang="en-US" sz="900" b="0" u="none" baseline="0" dirty="0">
               <a:solidFill>
@@ -6115,7 +5878,7 @@
             <a:pPr lvl="1"/>
             <a:r>
               <a:rPr lang="en-US" dirty="0"/>
-              <a:t>Within Dell, the Dell EMC CNA covers Dell, EMC products, and the products of many of their subsidiary companies; however, they do not cover VMware, which has its own CNA program</a:t>
+              <a:t>Within Dell, the Dell CNA covers Dell, EMC products, and the products of many of their subsidiary companies; however, they do not cover VMware, which has its own CNA program</a:t>
             </a:r>
           </a:p>
         </p:txBody>
@@ -6519,13 +6282,8 @@
             <a:pPr lvl="1"/>
             <a:r>
               <a:rPr lang="en-US" dirty="0"/>
-              <a:t>e.g., Rapid 7, </a:t>
-            </a:r>
-            <a:r>
-              <a:rPr lang="en-US" dirty="0" err="1"/>
-              <a:t>IOActive</a:t>
-            </a:r>
-            <a:endParaRPr lang="en-US" dirty="0"/>
+              <a:t>e.g., Rapid7</a:t>
+            </a:r>
           </a:p>
           <a:p>
             <a:r>
@@ -6537,15 +6295,7 @@
             <a:pPr lvl="1"/>
             <a:r>
               <a:rPr lang="en-US" dirty="0"/>
-              <a:t>e.g., </a:t>
-            </a:r>
-            <a:r>
-              <a:rPr lang="en-US" dirty="0" err="1"/>
-              <a:t>Flexera</a:t>
-            </a:r>
-            <a:r>
-              <a:rPr lang="en-US" dirty="0"/>
-              <a:t> (vendor and research), Drupal (vendor and coordinator)</a:t>
+              <a:t>e.g., Flexera (vendor and research), Drupal (vendor and coordinator)</a:t>
             </a:r>
           </a:p>
           <a:p>
@@ -6646,7 +6396,7 @@
           <a:p>
             <a:r>
               <a:rPr lang="en-US" dirty="0"/>
-              <a:t>All advisories must meet CVE’s requirements for being published:</a:t>
+              <a:t>All advisories must meet the CVE Program’s requirements for being published:</a:t>
             </a:r>
           </a:p>
           <a:p>
@@ -6667,7 +6417,7 @@
             <a:pPr lvl="1"/>
             <a:r>
               <a:rPr lang="en-US" dirty="0"/>
-              <a:t>The document linked to the URL must contain the minimum required information for a CVE entry:</a:t>
+              <a:t>The document linked to the URL must contain the minimum required information for a CVE Entry:</a:t>
             </a:r>
           </a:p>
           <a:p>
@@ -7078,7 +6828,12 @@
             <p:ph idx="1"/>
           </p:nvPr>
         </p:nvSpPr>
-        <p:spPr/>
+        <p:spPr>
+          <a:xfrm>
+            <a:off x="609600" y="1447800"/>
+            <a:ext cx="8229600" cy="4589745"/>
+          </a:xfrm>
+        </p:spPr>
         <p:txBody>
           <a:bodyPr>
             <a:normAutofit lnSpcReduction="10000"/>
@@ -7107,7 +6862,7 @@
             <a:pPr lvl="1"/>
             <a:r>
               <a:rPr lang="en-US" dirty="0"/>
-              <a:t>A registry of contact information is maintained on MITRE’s site [1]</a:t>
+              <a:t>A registry of contact information is maintained on the CVE Program website [1]</a:t>
             </a:r>
           </a:p>
           <a:p>
@@ -7140,7 +6895,17 @@
           <a:p>
             <a:r>
               <a:rPr lang="en-US" dirty="0"/>
-              <a:t>[1] http://cve.mitre.org/cve/request_id.html#cna_coverage.html</a:t>
+              <a:t>[1] </a:t>
+            </a:r>
+            <a:r>
+              <a:rPr lang="en-US" dirty="0">
+                <a:hlinkClick r:id="rId3"/>
+              </a:rPr>
+              <a:t>https://cve.mitre.org/cve/request_id.html#cna_coverage.html</a:t>
+            </a:r>
+            <a:r>
+              <a:rPr lang="en-US" dirty="0"/>
+              <a:t> </a:t>
             </a:r>
           </a:p>
           <a:p>
@@ -7625,13 +7390,13 @@
           <a:p>
             <a:r>
               <a:rPr lang="en-US" dirty="0"/>
-              <a:t>CNAs will receive requests to update CVE entries that have been created; a process should be established to handle these requests</a:t>
-            </a:r>
-          </a:p>
-          <a:p>
-            <a:r>
-              <a:rPr lang="en-US" dirty="0"/>
-              <a:t>If the request to update a CVE entry is sent to a Root CNA or the Primary CNA, the issuing CNA should decide if they want to be notified.</a:t>
+              <a:t>CNAs will receive requests to update CVE Entries that have been created; a process should be established to handle these requests</a:t>
+            </a:r>
+          </a:p>
+          <a:p>
+            <a:r>
+              <a:rPr lang="en-US" dirty="0"/>
+              <a:t>If the request to update a CVE Entry is sent to a Root CNA or the Program Root CNA, the issuing CNA should decide if they want to be notified.</a:t>
             </a:r>
           </a:p>
           <a:p>
@@ -7755,26 +7520,22 @@
             </a:br>
             <a:r>
               <a:rPr lang="en-US" dirty="0"/>
-              <a:t>Rationale: This gives an idea of how much vulnerability disclosure activity there is in each CNA which can then be extrapolated to sectors or some other category of CNA.</a:t>
+              <a:t>Rationale: This gives an idea of how much vulnerability disclosure activity there is in each CNA, which can then be extrapolated to sectors or some other category of CNA.</a:t>
             </a:r>
           </a:p>
           <a:p>
             <a:pPr lvl="2"/>
             <a:r>
               <a:rPr lang="en-US" dirty="0"/>
-              <a:t>Average time between assignment of CVE ID and publication of CVE ID entry</a:t>
+              <a:t>Average time between assignment of CVE ID and publication of CVE Entry</a:t>
             </a:r>
             <a:br>
               <a:rPr lang="en-US" dirty="0"/>
             </a:br>
             <a:r>
               <a:rPr lang="en-US" dirty="0"/>
-              <a:t>Rationale: Again, taken in aggregate, gives an idea for what the common time frames are, which can inform discussions of best practice.</a:t>
-            </a:r>
-          </a:p>
-          <a:p>
-            <a:pPr lvl="2"/>
-            <a:endParaRPr lang="en-US" dirty="0"/>
+              <a:t>Rationale: Again, taken in aggregate, gives an idea for what the common timeframes are, which can inform discussions of best practice.</a:t>
+            </a:r>
           </a:p>
         </p:txBody>
       </p:sp>
@@ -8239,7 +8000,15 @@
             <a:pPr lvl="1"/>
             <a:r>
               <a:rPr lang="en-US" dirty="0"/>
-              <a:t>A CNA Rules review</a:t>
+              <a:t>A </a:t>
+            </a:r>
+            <a:r>
+              <a:rPr lang="en-US" i="1" dirty="0"/>
+              <a:t>CNA Rules </a:t>
+            </a:r>
+            <a:r>
+              <a:rPr lang="en-US" dirty="0"/>
+              <a:t>review</a:t>
             </a:r>
           </a:p>
           <a:p>
@@ -8279,7 +8048,7 @@
             <a:pPr lvl="1"/>
             <a:r>
               <a:rPr lang="en-US" dirty="0"/>
-              <a:t>MITRE can help provide supplemental material</a:t>
+              <a:t>Program Root CNA (currently MITRE) can help provide supplemental material</a:t>
             </a:r>
           </a:p>
         </p:txBody>
@@ -8628,7 +8397,7 @@
             </a:pPr>
             <a:r>
               <a:rPr lang="en-US" dirty="0"/>
-              <a:t>The following rules apply to all CNAs when assigning CVEs to vulnerabilities:</a:t>
+              <a:t>The following rules apply to all CNAs when assigning CVE IDs to vulnerabilities:</a:t>
             </a:r>
           </a:p>
           <a:p>
@@ -8650,7 +8419,7 @@
             </a:pPr>
             <a:r>
               <a:rPr lang="en-US" dirty="0"/>
-              <a:t>Only assign CVE IDs to security vulnerabilities when no lower level CNA exists which already covers a more constrained scope (this may require coordination)</a:t>
+              <a:t>Only assign CVE IDs to security vulnerabilities when no lower level CNA exists that already covers a more constrained scope (this may require coordination)</a:t>
             </a:r>
           </a:p>
           <a:p>
@@ -8661,7 +8430,7 @@
             </a:pPr>
             <a:r>
               <a:rPr lang="en-US" dirty="0"/>
-              <a:t>Follow CVE counting rules established by the CVE Program as implemented by the Primary CNA and augmented by Root CNAs and Sub-CNAs if applicable</a:t>
+              <a:t>Follow CVE counting rules established by the CVE Program as implemented by the Program Root CNA and augmented by Root CNAs and Sub-CNAs if applicable</a:t>
             </a:r>
           </a:p>
           <a:p>
@@ -8819,7 +8588,7 @@
             <a:pPr lvl="1"/>
             <a:r>
               <a:rPr lang="en-US" dirty="0"/>
-              <a:t>If a CNA accepts requests from parties outside the CNA, provide a means (e.g., hyperlink, e-mail) for the public to contact them regarding vulnerabilities. CNAs can also provide guidelines for how to communicate with them, such as language restrictions (“English-only”, “Japanese or English”, etc.). Provide the list publicly and to all levels above their own</a:t>
+              <a:t>If a CNA accepts requests from parties outside the CNA, provide a means (e.g., hyperlink, email) for the public to contact them regarding vulnerabilities. CNAs can also provide guidelines for how to communicate with them, such as language restrictions (“English-only”, “Japanese or English”, etc.). Provide the list publicly and to all levels above their own</a:t>
             </a:r>
           </a:p>
           <a:p>
@@ -8950,7 +8719,7 @@
             </a:pPr>
             <a:r>
               <a:rPr lang="en-US" dirty="0"/>
-              <a:t>Notify the next higher level CNA when CVEs are assigned and the associated vulnerability is made public (the publication of the vulnerability can be made in any language, but the CVE ID entry must include English only; references to information related to the CVE ID in non-English languages would be included in the reference list for the CVE ID entry)</a:t>
+              <a:t>Notify the next higher level CNA when CVE IDs are assigned and the associated vulnerability is made public (the publication of the vulnerability can be made in any language, but the CVE ID entry must include English only; references to information related to the CVE ID in non-English languages would be included in the reference list for the CVE ID entry)</a:t>
             </a:r>
           </a:p>
           <a:p>
@@ -8961,7 +8730,7 @@
             </a:pPr>
             <a:r>
               <a:rPr lang="en-US" dirty="0"/>
-              <a:t>Provide CVE information to the next higher level CNA when a CVE ID is assigned and the associated vulnerability made public </a:t>
+              <a:t>Provide CVE information to the next higher-level CNA when a CVE ID is assigned and the associated vulnerability made public </a:t>
             </a:r>
           </a:p>
           <a:p>
@@ -9117,14 +8886,21 @@
             <a:pPr lvl="1"/>
             <a:r>
               <a:rPr lang="en-US" dirty="0"/>
-              <a:t>Operate under the CVE Terms of Use</a:t>
-            </a:r>
+              <a:t>Operate under the CVE </a:t>
+            </a:r>
+            <a:r>
+              <a:rPr lang="en-US" dirty="0">
+                <a:hlinkClick r:id="rId2"/>
+              </a:rPr>
+              <a:t>Terms of Use</a:t>
+            </a:r>
+            <a:endParaRPr lang="en-US" dirty="0"/>
           </a:p>
           <a:p>
             <a:pPr lvl="1"/>
             <a:r>
               <a:rPr lang="en-US" dirty="0"/>
-              <a:t>Track and provide metrics related to responsiveness to higher level CNAs</a:t>
+              <a:t>Track and provide metrics related to responsiveness to higher-level CNAs</a:t>
             </a:r>
           </a:p>
           <a:p>
@@ -9138,7 +8914,7 @@
             <a:pPr lvl="2"/>
             <a:r>
               <a:rPr lang="en-US" dirty="0"/>
-              <a:t>Metrics are provided quarterly to the next higher level CNA </a:t>
+              <a:t>Metrics are provided quarterly to the next higher-level CNA </a:t>
             </a:r>
           </a:p>
           <a:p>
@@ -9152,7 +8928,7 @@
             <a:pPr lvl="1"/>
             <a:r>
               <a:rPr lang="en-US" dirty="0"/>
-              <a:t>Provide any documentation required to adjudicate disputes to the higher level CNA</a:t>
+              <a:t>Provide any documentation required to adjudicate disputes to the higher-level CNA</a:t>
             </a:r>
           </a:p>
           <a:p>
@@ -9269,7 +9045,7 @@
           <a:p>
             <a:r>
               <a:rPr lang="en-US" dirty="0"/>
-              <a:t>In addition to following the afore mentioned rules, Root CNAs must perform the following functions:</a:t>
+              <a:t>In addition to following the aforementioned rules, Root CNAs must perform the following functions:</a:t>
             </a:r>
           </a:p>
           <a:p>
@@ -9283,7 +9059,7 @@
             <a:pPr lvl="2"/>
             <a:r>
               <a:rPr lang="en-US" dirty="0"/>
-              <a:t>Request CVE ID blocks from the Primary CNA</a:t>
+              <a:t>Request CVE ID blocks from the Program Root CNA</a:t>
             </a:r>
           </a:p>
           <a:p>
@@ -9318,21 +9094,21 @@
             <a:pPr lvl="2"/>
             <a:r>
               <a:rPr lang="en-US" dirty="0"/>
-              <a:t>Notify the Primary CNA when Sub-CNAs are established or removed</a:t>
+              <a:t>Notify the Program Root CNA when Sub-CNAs are established or removed</a:t>
             </a:r>
           </a:p>
           <a:p>
             <a:pPr lvl="2"/>
             <a:r>
               <a:rPr lang="en-US" dirty="0"/>
-              <a:t>Provide a public list of POCs and web links for each Sub-CNA in the Root CNA's domain; provide this information to the Primary CNA</a:t>
+              <a:t>Provide a public list of POCs and web links for each Sub-CNA in the Root CNA's domain; provide this information to the Program Root CNA</a:t>
             </a:r>
           </a:p>
           <a:p>
             <a:pPr lvl="2"/>
             <a:r>
               <a:rPr lang="en-US" dirty="0"/>
-              <a:t>Maintain a private list of individual POCs within each Sub-CNA for use by CNAs only; provide this information to the Primary CNA</a:t>
+              <a:t>Maintain a private list of individual POCs within each Sub-CNA for use by CNAs only; provide this information to the Program Root CNA</a:t>
             </a:r>
           </a:p>
           <a:p>
@@ -9341,11 +9117,6 @@
               <a:rPr lang="en-US" dirty="0"/>
               <a:t>Maintain a public listing of the established counting rules followed by the Root CNA and Sub-CNAs in its domain</a:t>
             </a:r>
-            <a:endParaRPr lang="en-US" sz="2000" dirty="0"/>
-          </a:p>
-          <a:p>
-            <a:pPr lvl="2"/>
-            <a:endParaRPr lang="en-US" dirty="0"/>
           </a:p>
           <a:p>
             <a:pPr lvl="2"/>
@@ -9432,7 +9203,9 @@
         </p:nvSpPr>
         <p:spPr/>
         <p:txBody>
-          <a:bodyPr/>
+          <a:bodyPr>
+            <a:normAutofit lnSpcReduction="10000"/>
+          </a:bodyPr>
           <a:lstStyle/>
           <a:p>
             <a:pPr lvl="1"/>
@@ -9452,7 +9225,7 @@
             <a:pPr lvl="2"/>
             <a:r>
               <a:rPr lang="en-US" dirty="0"/>
-              <a:t>Submit metrics from Sub-CNAs quarterly, within two weeks of the quarter, to the Primary CNA; quarters are based on the calendar year</a:t>
+              <a:t>Submit metrics from Sub-CNAs quarterly, within two weeks of the quarter, to the Program Root CNA; quarters are based on the calendar year</a:t>
             </a:r>
           </a:p>
           <a:p>
@@ -9466,21 +9239,29 @@
             <a:pPr lvl="2"/>
             <a:r>
               <a:rPr lang="en-US" dirty="0"/>
-              <a:t>When appropriate, apply sanctions upon any Sub-CNAs within its domain and notify the Primary CNA; the application of sanctions should occur as a last resort</a:t>
+              <a:t>When appropriate, apply sanctions upon any Sub-CNAs within its domain and notify the Program Root CNA; the application of sanctions should occur as a last resort</a:t>
             </a:r>
           </a:p>
           <a:p>
             <a:pPr lvl="2"/>
             <a:r>
               <a:rPr lang="en-US" dirty="0"/>
-              <a:t>Facilitate the enforcement of any administrative actions taken by the Primary CNA against a Sub-CNA</a:t>
+              <a:t>Facilitate the enforcement of any administrative actions taken by the Program Root CNA against a Sub-CNA</a:t>
             </a:r>
           </a:p>
           <a:p>
             <a:pPr lvl="2"/>
             <a:r>
               <a:rPr lang="en-US" dirty="0"/>
-              <a:t>Follow the CNA Candidate Process described in Section 4 when adding new Sub-CNAs</a:t>
+              <a:t>Follow the CNA Candidate Process described in Section 4 of the </a:t>
+            </a:r>
+            <a:r>
+              <a:rPr lang="en-US" i="1" dirty="0"/>
+              <a:t>CNA Rules</a:t>
+            </a:r>
+            <a:r>
+              <a:rPr lang="en-US" dirty="0"/>
+              <a:t> when adding new Sub-CNAs</a:t>
             </a:r>
           </a:p>
           <a:p>
@@ -9541,12 +9322,14 @@
         </p:nvSpPr>
         <p:spPr/>
         <p:txBody>
-          <a:bodyPr/>
-          <a:lstStyle/>
-          <a:p>
-            <a:r>
-              <a:rPr lang="en-US" dirty="0"/>
-              <a:t>Additional Primary CNA Rules (1 of 2)</a:t>
+          <a:bodyPr>
+            <a:normAutofit fontScale="90000"/>
+          </a:bodyPr>
+          <a:lstStyle/>
+          <a:p>
+            <a:r>
+              <a:rPr lang="en-US" dirty="0"/>
+              <a:t>Additional Program Root CNA Rules (1 of 2)</a:t>
             </a:r>
           </a:p>
         </p:txBody>
@@ -9576,7 +9359,7 @@
           <a:p>
             <a:r>
               <a:rPr lang="en-US" dirty="0"/>
-              <a:t>In addition to following the afore mentioned rules, the Primary CNA must perform the following functions:</a:t>
+              <a:t>In addition to following the afore mentioned rules, the Program Root CNA must perform the following functions:</a:t>
             </a:r>
           </a:p>
           <a:p>
@@ -9710,12 +9493,14 @@
         </p:nvSpPr>
         <p:spPr/>
         <p:txBody>
-          <a:bodyPr/>
-          <a:lstStyle/>
-          <a:p>
-            <a:r>
-              <a:rPr lang="en-US" dirty="0"/>
-              <a:t>Additional Primary CNA Rules (2 of 2)</a:t>
+          <a:bodyPr>
+            <a:normAutofit fontScale="90000"/>
+          </a:bodyPr>
+          <a:lstStyle/>
+          <a:p>
+            <a:r>
+              <a:rPr lang="en-US" dirty="0"/>
+              <a:t>Additional Program Root CNA Rules (2 of 2)</a:t>
             </a:r>
           </a:p>
         </p:txBody>
@@ -9785,12 +9570,16 @@
             <a:pPr lvl="1"/>
             <a:r>
               <a:rPr lang="en-US" dirty="0"/>
-              <a:t>Follow the CNA Candidate Process described in Section 4 when adding new Root CNAs</a:t>
-            </a:r>
-          </a:p>
-          <a:p>
-            <a:pPr lvl="1"/>
-            <a:endParaRPr lang="en-US" dirty="0"/>
+              <a:t>Follow the CNA Candidate Process described in Section 4 of the </a:t>
+            </a:r>
+            <a:r>
+              <a:rPr lang="en-US" i="1" dirty="0"/>
+              <a:t>CNA Rules </a:t>
+            </a:r>
+            <a:r>
+              <a:rPr lang="en-US" dirty="0"/>
+              <a:t>when adding new Root CNAs</a:t>
+            </a:r>
           </a:p>
           <a:p>
             <a:pPr lvl="1"/>
@@ -9889,7 +9678,7 @@
             <a:pPr lvl="1"/>
             <a:r>
               <a:rPr lang="en-US" dirty="0"/>
-              <a:t>CNAs help to address the CVE Program's primary challenge to satisfy the demand for timely, accurate CVE assignments while rapidly expanding the scope of coverage to address the increasing number of vulnerabilities and evolving state of vulnerability management. </a:t>
+              <a:t>CNAs help to address the CVE Program's primary challenge to satisfy the demand for timely, accurate CVE ID assignments while rapidly expanding the scope of coverage to address the increasing number of vulnerabilities and evolving state of vulnerability management. </a:t>
             </a:r>
           </a:p>
           <a:p>
@@ -10021,7 +9810,7 @@
             </a:pPr>
             <a:r>
               <a:rPr lang="en-US" dirty="0"/>
-              <a:t>For situations where CVE assignment decisions are disputed, or where there is a disagreement between Root CNAs or between a Root CNA and one of their Sub-CNAs, the following process should be followed to resolve the issues:</a:t>
+              <a:t>For situations where CVE ID assignment decisions are disputed, or where there is a disagreement between Root CNAs or between a Root CNA and one of their Sub-CNAs, the following process should be followed to resolve the issues:</a:t>
             </a:r>
           </a:p>
           <a:p>
@@ -10032,7 +9821,7 @@
             </a:pPr>
             <a:r>
               <a:rPr lang="en-US" dirty="0"/>
-              <a:t>The party seeking to appeal a decision made by a Root CNA, or resolve a disagreement between Root CNAs, contacts the Primary CNA at </a:t>
+              <a:t>The party seeking to appeal a decision made by a Root CNA, or resolve a disagreement between Root CNAs, contacts the Program Root CNA at </a:t>
             </a:r>
             <a:r>
               <a:rPr lang="en-US" u="sng" dirty="0">
@@ -10053,7 +9842,7 @@
             </a:pPr>
             <a:r>
               <a:rPr lang="en-US" dirty="0"/>
-              <a:t>The Primary CNA sets expectations for when a timely resolution may be available; appeals of time-sensitive issues are prioritized, as determined by the Primary CNA</a:t>
+              <a:t>The Program Root CNA sets expectations for when a timely resolution may be available; appeals of time-sensitive issues are prioritized, as determined by the Program Root CNA</a:t>
             </a:r>
           </a:p>
           <a:p>
@@ -10064,7 +9853,15 @@
             </a:pPr>
             <a:r>
               <a:rPr lang="en-US" dirty="0"/>
-              <a:t>The Primary CNA contacts the appropriate entities to collect information relevant to the issue. The CNAs involved in the dispute provide documentation per the rules established in this document. The Primary CNA may also engage the CVE Board for their consideration of the issue</a:t>
+              <a:t>The Program Root CNA contacts the appropriate entities to collect information relevant to the issue. The CNAs involved in the dispute provide documentation per the rules established in the </a:t>
+            </a:r>
+            <a:r>
+              <a:rPr lang="en-US" i="1" dirty="0"/>
+              <a:t>CNA Rules</a:t>
+            </a:r>
+            <a:r>
+              <a:rPr lang="en-US" dirty="0"/>
+              <a:t>. The Program Root CNA may also engage the CVE Board for their consideration of the issue</a:t>
             </a:r>
           </a:p>
           <a:p>
@@ -10075,7 +9872,7 @@
             </a:pPr>
             <a:r>
               <a:rPr lang="en-US" dirty="0"/>
-              <a:t>The Primary CNA communicates its decision to all relevant parties once the disagreement or appeal has been fully considered; this result is final</a:t>
+              <a:t>The Program Root CNA communicates its decision to all relevant parties once the disagreement or appeal has been fully considered; this result is final</a:t>
             </a:r>
           </a:p>
           <a:p>
@@ -10365,7 +10162,11 @@
             </a:pPr>
             <a:r>
               <a:rPr lang="en-US" dirty="0"/>
-              <a:t>Willing to follow CNA rules</a:t>
+              <a:t>Willing to follow </a:t>
+            </a:r>
+            <a:r>
+              <a:rPr lang="en-US" i="1" dirty="0"/>
+              <a:t>CNA Rules</a:t>
             </a:r>
           </a:p>
           <a:p>
@@ -10503,7 +10304,11 @@
           <a:p>
             <a:r>
               <a:rPr lang="en-US" dirty="0"/>
-              <a:t>You are expected to put in the time and effort to implement the CNA Rules</a:t>
+              <a:t>You are expected to put in the time and effort to implement the </a:t>
+            </a:r>
+            <a:r>
+              <a:rPr lang="en-US" i="1" dirty="0"/>
+              <a:t>CNA Rules</a:t>
             </a:r>
           </a:p>
           <a:p>
@@ -10612,7 +10417,7 @@
           <a:p>
             <a:r>
               <a:rPr lang="en-US" dirty="0"/>
-              <a:t>If you are not sure, contact MITRE:</a:t>
+              <a:t>If you are not sure, contact the CVE Program Root CNA:</a:t>
             </a:r>
           </a:p>
           <a:p>
@@ -10644,8 +10449,14 @@
           <a:p>
             <a:pPr lvl="1"/>
             <a:r>
-              <a:rPr lang="en-US" dirty="0"/>
-              <a:t>http://cve.mitre.org/cve/request_id.html#cna_coverage.html</a:t>
+              <a:rPr lang="en-US" dirty="0">
+                <a:hlinkClick r:id="rId4"/>
+              </a:rPr>
+              <a:t>https://cve.mitre.org/cve/request_id.html#cna_coverage.html</a:t>
+            </a:r>
+            <a:r>
+              <a:rPr lang="en-US" dirty="0"/>
+              <a:t> </a:t>
             </a:r>
           </a:p>
         </p:txBody>
@@ -11547,13 +11358,13 @@
 <file path=customXml/itemProps3.xml><?xml version="1.0" encoding="utf-8"?>
 <ds:datastoreItem xmlns:ds="http://schemas.openxmlformats.org/officeDocument/2006/customXml" ds:itemID="{760E1BCA-B7C8-4D5D-A2B9-87067345F3DD}">
   <ds:schemaRefs>
-    <ds:schemaRef ds:uri="http://purl.org/dc/elements/1.1/"/>
-    <ds:schemaRef ds:uri="http://schemas.microsoft.com/office/2006/metadata/properties"/>
-    <ds:schemaRef ds:uri="http://schemas.microsoft.com/sharepoint/v3"/>
     <ds:schemaRef ds:uri="http://purl.org/dc/terms/"/>
     <ds:schemaRef ds:uri="http://schemas.openxmlformats.org/package/2006/metadata/core-properties"/>
     <ds:schemaRef ds:uri="http://schemas.microsoft.com/office/2006/documentManagement/types"/>
     <ds:schemaRef ds:uri="http://schemas.microsoft.com/office/infopath/2007/PartnerControls"/>
+    <ds:schemaRef ds:uri="http://purl.org/dc/elements/1.1/"/>
+    <ds:schemaRef ds:uri="http://schemas.microsoft.com/office/2006/metadata/properties"/>
+    <ds:schemaRef ds:uri="http://schemas.microsoft.com/sharepoint/v3"/>
     <ds:schemaRef ds:uri="http://schemas.microsoft.com/sharepoint/v3/fields"/>
     <ds:schemaRef ds:uri="http://www.w3.org/XML/1998/namespace"/>
     <ds:schemaRef ds:uri="http://purl.org/dc/dcmitype/"/>

</xml_diff>

<commit_message>
Revert "Upload updated Becoming a CNA pptx"
</commit_message>
<xml_diff>
--- a/docs/cna/Becoming a CNA.pptx
+++ b/docs/cna/Becoming a CNA.pptx
@@ -191,6 +191,24 @@
 </p:cmAuthorLst>
 </file>
 
+<file path=ppt/revisionInfo.xml><?xml version="1.0" encoding="utf-8"?>
+<p1510:revInfo xmlns:a="http://schemas.openxmlformats.org/drawingml/2006/main" xmlns:r="http://schemas.openxmlformats.org/officeDocument/2006/relationships" xmlns:p1510="http://schemas.microsoft.com/office/powerpoint/2015/10/main"/>
+</file>
+
+<file path=ppt/comments/comment1.xml><?xml version="1.0" encoding="utf-8"?>
+<p:cmLst xmlns:a="http://schemas.openxmlformats.org/drawingml/2006/main" xmlns:r="http://schemas.openxmlformats.org/officeDocument/2006/relationships" xmlns:p="http://schemas.openxmlformats.org/presentationml/2006/main">
+  <p:cm authorId="1" dt="2017-12-15T09:42:07.255" idx="12">
+    <p:pos x="3281" y="2993"/>
+    <p:text>The CNA rules are established in this training document? Or is there a formal set of CNA rules (CNA Processes, maybe?) that we should reference here instead?</p:text>
+    <p:extLst>
+      <p:ext uri="{C676402C-5697-4E1C-873F-D02D1690AC5C}">
+        <p15:threadingInfo xmlns:p15="http://schemas.microsoft.com/office/powerpoint/2012/main" timeZoneBias="300"/>
+      </p:ext>
+    </p:extLst>
+  </p:cm>
+</p:cmLst>
+</file>
+
 <file path=ppt/notesMasters/notesMaster1.xml><?xml version="1.0" encoding="utf-8"?>
 <p:notesMaster xmlns:a="http://schemas.openxmlformats.org/drawingml/2006/main" xmlns:r="http://schemas.openxmlformats.org/officeDocument/2006/relationships" xmlns:p="http://schemas.openxmlformats.org/presentationml/2006/main">
   <p:cSld>
@@ -273,7 +291,7 @@
           <a:p>
             <a:fld id="{C48A5AB8-C75E-4242-AC76-9DAE875A82E7}" type="datetimeFigureOut">
               <a:rPr lang="en-US" smtClean="0"/>
-              <a:t>1/31/2019</a:t>
+              <a:t>3/7/2018</a:t>
             </a:fld>
             <a:endParaRPr lang="en-US"/>
           </a:p>
@@ -832,90 +850,6 @@
 </p:notes>
 </file>
 
-<file path=ppt/notesSlides/notesSlide4.xml><?xml version="1.0" encoding="utf-8"?>
-<p:notes xmlns:a="http://schemas.openxmlformats.org/drawingml/2006/main" xmlns:r="http://schemas.openxmlformats.org/officeDocument/2006/relationships" xmlns:p="http://schemas.openxmlformats.org/presentationml/2006/main">
-  <p:cSld>
-    <p:spTree>
-      <p:nvGrpSpPr>
-        <p:cNvPr id="1" name=""/>
-        <p:cNvGrpSpPr/>
-        <p:nvPr/>
-      </p:nvGrpSpPr>
-      <p:grpSpPr>
-        <a:xfrm>
-          <a:off x="0" y="0"/>
-          <a:ext cx="0" cy="0"/>
-          <a:chOff x="0" y="0"/>
-          <a:chExt cx="0" cy="0"/>
-        </a:xfrm>
-      </p:grpSpPr>
-      <p:sp>
-        <p:nvSpPr>
-          <p:cNvPr id="2" name="Slide Image Placeholder 1"/>
-          <p:cNvSpPr>
-            <a:spLocks noGrp="1" noRot="1" noChangeAspect="1"/>
-          </p:cNvSpPr>
-          <p:nvPr>
-            <p:ph type="sldImg"/>
-          </p:nvPr>
-        </p:nvSpPr>
-        <p:spPr/>
-      </p:sp>
-      <p:sp>
-        <p:nvSpPr>
-          <p:cNvPr id="3" name="Notes Placeholder 2"/>
-          <p:cNvSpPr>
-            <a:spLocks noGrp="1"/>
-          </p:cNvSpPr>
-          <p:nvPr>
-            <p:ph type="body" idx="1"/>
-          </p:nvPr>
-        </p:nvSpPr>
-        <p:spPr/>
-        <p:txBody>
-          <a:bodyPr/>
-          <a:lstStyle/>
-          <a:p>
-            <a:endParaRPr lang="en-US" dirty="0"/>
-          </a:p>
-        </p:txBody>
-      </p:sp>
-      <p:sp>
-        <p:nvSpPr>
-          <p:cNvPr id="4" name="Slide Number Placeholder 3"/>
-          <p:cNvSpPr>
-            <a:spLocks noGrp="1"/>
-          </p:cNvSpPr>
-          <p:nvPr>
-            <p:ph type="sldNum" sz="quarter" idx="5"/>
-          </p:nvPr>
-        </p:nvSpPr>
-        <p:spPr/>
-        <p:txBody>
-          <a:bodyPr/>
-          <a:lstStyle/>
-          <a:p>
-            <a:fld id="{D26DA38A-5B6D-4B73-8631-E3ACB22184B3}" type="slidenum">
-              <a:rPr lang="en-US" smtClean="0"/>
-              <a:t>24</a:t>
-            </a:fld>
-            <a:endParaRPr lang="en-US"/>
-          </a:p>
-        </p:txBody>
-      </p:sp>
-    </p:spTree>
-    <p:extLst>
-      <p:ext uri="{BB962C8B-B14F-4D97-AF65-F5344CB8AC3E}">
-        <p14:creationId xmlns:p14="http://schemas.microsoft.com/office/powerpoint/2010/main" val="3512228826"/>
-      </p:ext>
-    </p:extLst>
-  </p:cSld>
-  <p:clrMapOvr>
-    <a:masterClrMapping/>
-  </p:clrMapOvr>
-</p:notes>
-</file>
-
 <file path=ppt/slideLayouts/slideLayout1.xml><?xml version="1.0" encoding="utf-8"?>
 <p:sldLayout xmlns:a="http://schemas.openxmlformats.org/drawingml/2006/main" xmlns:r="http://schemas.openxmlformats.org/officeDocument/2006/relationships" xmlns:p="http://schemas.openxmlformats.org/presentationml/2006/main" showMasterSp="0" preserve="1">
   <p:cSld name="Title Slide">
@@ -1173,60 +1107,18 @@
           </a:p>
         </p:txBody>
       </p:sp>
-      <p:pic>
-        <p:nvPicPr>
-          <p:cNvPr id="11" name="Picture 10">
-            <a:extLst>
-              <a:ext uri="{FF2B5EF4-FFF2-40B4-BE49-F238E27FC236}">
-                <a16:creationId xmlns:a16="http://schemas.microsoft.com/office/drawing/2014/main" id="{4431EE9E-871D-4417-AE49-F07F4743822B}"/>
-              </a:ext>
-            </a:extLst>
-          </p:cNvPr>
-          <p:cNvPicPr>
-            <a:picLocks noChangeAspect="1"/>
-          </p:cNvPicPr>
-          <p:nvPr userDrawn="1"/>
-        </p:nvPicPr>
-        <p:blipFill>
-          <a:blip r:embed="rId2">
-            <a:extLst>
-              <a:ext uri="{28A0092B-C50C-407E-A947-70E740481C1C}">
-                <a14:useLocalDpi xmlns:a14="http://schemas.microsoft.com/office/drawing/2010/main" val="0"/>
-              </a:ext>
-            </a:extLst>
-          </a:blip>
-          <a:stretch>
-            <a:fillRect/>
-          </a:stretch>
-        </p:blipFill>
-        <p:spPr>
-          <a:xfrm>
-            <a:off x="618308" y="6209056"/>
-            <a:ext cx="1177735" cy="634662"/>
-          </a:xfrm>
-          <a:prstGeom prst="rect">
-            <a:avLst/>
-          </a:prstGeom>
-        </p:spPr>
-      </p:pic>
-      <p:sp>
-        <p:nvSpPr>
-          <p:cNvPr id="17" name="Text Box 34">
-            <a:extLst>
-              <a:ext uri="{FF2B5EF4-FFF2-40B4-BE49-F238E27FC236}">
-                <a16:creationId xmlns:a16="http://schemas.microsoft.com/office/drawing/2014/main" id="{F2A17C2D-B5A6-4461-85BF-FA227916D7BC}"/>
-              </a:ext>
-            </a:extLst>
-          </p:cNvPr>
+      <p:sp>
+        <p:nvSpPr>
+          <p:cNvPr id="13" name="Text Box 34"/>
           <p:cNvSpPr txBox="1">
             <a:spLocks noChangeArrowheads="1"/>
           </p:cNvSpPr>
-          <p:nvPr userDrawn="1"/>
+          <p:nvPr/>
         </p:nvSpPr>
         <p:spPr bwMode="auto">
           <a:xfrm>
-            <a:off x="2489982" y="6353061"/>
-            <a:ext cx="6430416" cy="369332"/>
+            <a:off x="3845490" y="6256122"/>
+            <a:ext cx="5184930" cy="507831"/>
           </a:xfrm>
           <a:prstGeom prst="rect">
             <a:avLst/>
@@ -1246,62 +1138,111 @@
           </a:bodyPr>
           <a:lstStyle/>
           <a:p>
-            <a:pPr algn="l" eaLnBrk="0" hangingPunct="0">
+            <a:pPr algn="r" eaLnBrk="0" hangingPunct="0">
               <a:defRPr/>
             </a:pPr>
             <a:r>
-              <a:rPr lang="en-US" sz="900" dirty="0"/>
+              <a:rPr lang="en-US" sz="900" kern="1200" baseline="0" dirty="0">
+                <a:solidFill>
+                  <a:schemeClr val="tx1"/>
+                </a:solidFill>
+                <a:latin typeface="+mn-lt"/>
+                <a:ea typeface="+mn-ea"/>
+                <a:cs typeface="+mn-cs"/>
+              </a:rPr>
               <a:t>CVE is sponsored by </a:t>
             </a:r>
             <a:r>
-              <a:rPr lang="en-US" sz="900" dirty="0">
+              <a:rPr lang="en-US" sz="900" kern="1200" baseline="0" dirty="0">
+                <a:solidFill>
+                  <a:schemeClr val="tx1"/>
+                </a:solidFill>
+                <a:latin typeface="+mn-lt"/>
+                <a:ea typeface="+mn-ea"/>
+                <a:cs typeface="+mn-cs"/>
+                <a:hlinkClick r:id="rId2"/>
+              </a:rPr>
+              <a:t>US-CERT</a:t>
+            </a:r>
+            <a:r>
+              <a:rPr lang="en-US" sz="900" kern="1200" baseline="0" dirty="0">
+                <a:solidFill>
+                  <a:schemeClr val="tx1"/>
+                </a:solidFill>
+                <a:latin typeface="+mn-lt"/>
+                <a:ea typeface="+mn-ea"/>
+                <a:cs typeface="+mn-cs"/>
+              </a:rPr>
+              <a:t> in the office of </a:t>
+            </a:r>
+            <a:r>
+              <a:rPr lang="en-US" sz="900" kern="1200" baseline="0" dirty="0">
+                <a:solidFill>
+                  <a:schemeClr val="tx1"/>
+                </a:solidFill>
+                <a:latin typeface="+mn-lt"/>
+                <a:ea typeface="+mn-ea"/>
+                <a:cs typeface="+mn-cs"/>
                 <a:hlinkClick r:id="rId3"/>
               </a:rPr>
-              <a:t>NSD</a:t>
-            </a:r>
-            <a:r>
-              <a:rPr lang="en-US" sz="900" dirty="0"/>
-              <a:t>, </a:t>
-            </a:r>
-            <a:r>
-              <a:rPr lang="en-US" sz="900" dirty="0">
+              <a:t>Cybersecurity and Communications </a:t>
+            </a:r>
+            <a:r>
+              <a:rPr lang="en-US" sz="900" kern="1200" baseline="0" dirty="0">
+                <a:solidFill>
+                  <a:schemeClr val="tx1"/>
+                </a:solidFill>
+                <a:latin typeface="+mn-lt"/>
+                <a:ea typeface="+mn-ea"/>
+                <a:cs typeface="+mn-cs"/>
+              </a:rPr>
+              <a:t>at the </a:t>
+            </a:r>
+            <a:r>
+              <a:rPr lang="en-US" sz="900" kern="1200" baseline="0" dirty="0">
+                <a:solidFill>
+                  <a:schemeClr val="tx1"/>
+                </a:solidFill>
+                <a:latin typeface="+mn-lt"/>
+                <a:ea typeface="+mn-ea"/>
+                <a:cs typeface="+mn-cs"/>
                 <a:hlinkClick r:id="rId4"/>
               </a:rPr>
-              <a:t>NCCIC</a:t>
-            </a:r>
-            <a:r>
-              <a:rPr lang="en-US" sz="900" dirty="0"/>
-              <a:t> in </a:t>
-            </a:r>
-            <a:r>
-              <a:rPr lang="en-US" sz="900" dirty="0">
+              <a:t>U.S. Department of Homeland Security</a:t>
+            </a:r>
+            <a:r>
+              <a:rPr lang="en-US" sz="900" kern="1200" baseline="0" dirty="0">
+                <a:solidFill>
+                  <a:schemeClr val="tx1"/>
+                </a:solidFill>
+                <a:latin typeface="+mn-lt"/>
+                <a:ea typeface="+mn-ea"/>
+                <a:cs typeface="+mn-cs"/>
+              </a:rPr>
+              <a:t>. Copyright © 1999–2018, </a:t>
+            </a:r>
+            <a:r>
+              <a:rPr lang="en-US" sz="900" kern="1200" baseline="0" dirty="0">
+                <a:solidFill>
+                  <a:schemeClr val="tx1"/>
+                </a:solidFill>
+                <a:latin typeface="+mn-lt"/>
+                <a:ea typeface="+mn-ea"/>
+                <a:cs typeface="+mn-cs"/>
                 <a:hlinkClick r:id="rId5"/>
               </a:rPr>
-              <a:t>CISA</a:t>
-            </a:r>
-            <a:r>
-              <a:rPr lang="en-US" sz="900" dirty="0"/>
-              <a:t>’s Cybersecurity Division at the </a:t>
-            </a:r>
-            <a:r>
-              <a:rPr lang="en-US" sz="900" dirty="0">
-                <a:hlinkClick r:id="rId6"/>
+              <a:t>The MITRE Corporation</a:t>
+            </a:r>
+            <a:r>
+              <a:rPr lang="en-US" sz="900" kern="1200" baseline="0" dirty="0">
+                <a:solidFill>
+                  <a:schemeClr val="tx1"/>
+                </a:solidFill>
+                <a:latin typeface="+mn-lt"/>
+                <a:ea typeface="+mn-ea"/>
+                <a:cs typeface="+mn-cs"/>
               </a:rPr>
-              <a:t>U.S. Department of Homeland Security</a:t>
-            </a:r>
-            <a:r>
-              <a:rPr lang="en-US" sz="900" dirty="0"/>
-              <a:t>. Copyright © 1999–2019, </a:t>
-            </a:r>
-            <a:r>
-              <a:rPr lang="en-US" sz="900" dirty="0">
-                <a:hlinkClick r:id="rId7"/>
-              </a:rPr>
-              <a:t>The MITRE Corporation</a:t>
-            </a:r>
-            <a:r>
-              <a:rPr lang="en-US" sz="900" dirty="0"/>
-              <a:t>. CVE and the CVE logo are registered trademarks of The MITRE Corporation.</a:t>
+              <a:t>. CVE and the CVE logo are registered trademarks and CVE-Compatible is a trademark of The MITRE Corporation.</a:t>
             </a:r>
             <a:endParaRPr lang="en-US" altLang="en-US" sz="900" b="0" u="none" baseline="0" dirty="0">
               <a:solidFill>
@@ -1309,6 +1250,125 @@
               </a:solidFill>
               <a:cs typeface="+mn-cs"/>
             </a:endParaRPr>
+          </a:p>
+        </p:txBody>
+      </p:sp>
+      <p:pic>
+        <p:nvPicPr>
+          <p:cNvPr id="2" name="Picture 1"/>
+          <p:cNvPicPr>
+            <a:picLocks noChangeAspect="1"/>
+          </p:cNvPicPr>
+          <p:nvPr/>
+        </p:nvPicPr>
+        <p:blipFill>
+          <a:blip r:embed="rId6">
+            <a:extLst>
+              <a:ext uri="{28A0092B-C50C-407E-A947-70E740481C1C}">
+                <a14:useLocalDpi xmlns:a14="http://schemas.microsoft.com/office/drawing/2010/main" val="0"/>
+              </a:ext>
+            </a:extLst>
+          </a:blip>
+          <a:stretch>
+            <a:fillRect/>
+          </a:stretch>
+        </p:blipFill>
+        <p:spPr>
+          <a:xfrm>
+            <a:off x="524456" y="6149707"/>
+            <a:ext cx="1101840" cy="521537"/>
+          </a:xfrm>
+          <a:prstGeom prst="rect">
+            <a:avLst/>
+          </a:prstGeom>
+        </p:spPr>
+      </p:pic>
+      <p:pic>
+        <p:nvPicPr>
+          <p:cNvPr id="16" name="Picture 15"/>
+          <p:cNvPicPr>
+            <a:picLocks noChangeAspect="1"/>
+          </p:cNvPicPr>
+          <p:nvPr/>
+        </p:nvPicPr>
+        <p:blipFill>
+          <a:blip r:embed="rId6">
+            <a:extLst>
+              <a:ext uri="{28A0092B-C50C-407E-A947-70E740481C1C}">
+                <a14:useLocalDpi xmlns:a14="http://schemas.microsoft.com/office/drawing/2010/main" val="0"/>
+              </a:ext>
+            </a:extLst>
+          </a:blip>
+          <a:stretch>
+            <a:fillRect/>
+          </a:stretch>
+        </p:blipFill>
+        <p:spPr>
+          <a:xfrm>
+            <a:off x="5409764" y="280412"/>
+            <a:ext cx="1101840" cy="521537"/>
+          </a:xfrm>
+          <a:prstGeom prst="rect">
+            <a:avLst/>
+          </a:prstGeom>
+        </p:spPr>
+      </p:pic>
+      <p:sp>
+        <p:nvSpPr>
+          <p:cNvPr id="5" name="TextBox 4"/>
+          <p:cNvSpPr txBox="1"/>
+          <p:nvPr/>
+        </p:nvSpPr>
+        <p:spPr>
+          <a:xfrm>
+            <a:off x="6511605" y="187703"/>
+            <a:ext cx="2518816" cy="584775"/>
+          </a:xfrm>
+          <a:prstGeom prst="rect">
+            <a:avLst/>
+          </a:prstGeom>
+          <a:solidFill>
+            <a:schemeClr val="bg1"/>
+          </a:solidFill>
+        </p:spPr>
+        <p:txBody>
+          <a:bodyPr wrap="square" rtlCol="0">
+            <a:spAutoFit/>
+          </a:bodyPr>
+          <a:lstStyle/>
+          <a:p>
+            <a:pPr>
+              <a:spcAft>
+                <a:spcPts val="0"/>
+              </a:spcAft>
+            </a:pPr>
+            <a:r>
+              <a:rPr lang="en-US" sz="1600" b="1" baseline="0" dirty="0">
+                <a:solidFill>
+                  <a:srgbClr val="650800"/>
+                </a:solidFill>
+                <a:ea typeface="Verdana" pitchFamily="34" charset="0"/>
+                <a:cs typeface="Verdana" pitchFamily="34" charset="0"/>
+              </a:rPr>
+              <a:t>Common Vulnerabilities </a:t>
+            </a:r>
+          </a:p>
+          <a:p>
+            <a:pPr>
+              <a:spcAft>
+                <a:spcPts val="0"/>
+              </a:spcAft>
+            </a:pPr>
+            <a:r>
+              <a:rPr lang="en-US" sz="1600" b="1" baseline="0" dirty="0">
+                <a:solidFill>
+                  <a:srgbClr val="650800"/>
+                </a:solidFill>
+                <a:ea typeface="Verdana" pitchFamily="34" charset="0"/>
+                <a:cs typeface="Verdana" pitchFamily="34" charset="0"/>
+              </a:rPr>
+              <a:t>and Exposures</a:t>
+            </a:r>
           </a:p>
         </p:txBody>
       </p:sp>
@@ -3308,17 +3368,11 @@
       </p:sp>
       <p:pic>
         <p:nvPicPr>
-          <p:cNvPr id="12" name="Picture 11">
-            <a:extLst>
-              <a:ext uri="{FF2B5EF4-FFF2-40B4-BE49-F238E27FC236}">
-                <a16:creationId xmlns:a16="http://schemas.microsoft.com/office/drawing/2014/main" id="{3C326E03-BC68-47FB-AFD1-1389FB5095E5}"/>
-              </a:ext>
-            </a:extLst>
-          </p:cNvPr>
+          <p:cNvPr id="11" name="Picture 10"/>
           <p:cNvPicPr>
             <a:picLocks noChangeAspect="1"/>
           </p:cNvPicPr>
-          <p:nvPr userDrawn="1"/>
+          <p:nvPr/>
         </p:nvPicPr>
         <p:blipFill>
           <a:blip r:embed="rId2">
@@ -3334,8 +3388,8 @@
         </p:blipFill>
         <p:spPr>
           <a:xfrm>
-            <a:off x="618308" y="6209056"/>
-            <a:ext cx="1177735" cy="634662"/>
+            <a:off x="535564" y="6298118"/>
+            <a:ext cx="904929" cy="428333"/>
           </a:xfrm>
           <a:prstGeom prst="rect">
             <a:avLst/>
@@ -3344,22 +3398,16 @@
       </p:pic>
       <p:sp>
         <p:nvSpPr>
-          <p:cNvPr id="20" name="Text Box 34">
-            <a:extLst>
-              <a:ext uri="{FF2B5EF4-FFF2-40B4-BE49-F238E27FC236}">
-                <a16:creationId xmlns:a16="http://schemas.microsoft.com/office/drawing/2014/main" id="{C6639DB9-BE71-402F-A80D-1F2B8A487CCE}"/>
-              </a:ext>
-            </a:extLst>
-          </p:cNvPr>
+          <p:cNvPr id="15" name="Text Box 34"/>
           <p:cNvSpPr txBox="1">
             <a:spLocks noChangeArrowheads="1"/>
           </p:cNvSpPr>
-          <p:nvPr userDrawn="1"/>
+          <p:nvPr/>
         </p:nvSpPr>
         <p:spPr bwMode="auto">
           <a:xfrm>
-            <a:off x="2489982" y="6353061"/>
-            <a:ext cx="6430416" cy="369332"/>
+            <a:off x="3845490" y="6256122"/>
+            <a:ext cx="5184930" cy="507831"/>
           </a:xfrm>
           <a:prstGeom prst="rect">
             <a:avLst/>
@@ -3379,62 +3427,111 @@
           </a:bodyPr>
           <a:lstStyle/>
           <a:p>
-            <a:pPr algn="l" eaLnBrk="0" hangingPunct="0">
+            <a:pPr algn="r" eaLnBrk="0" hangingPunct="0">
               <a:defRPr/>
             </a:pPr>
             <a:r>
-              <a:rPr lang="en-US" sz="900" dirty="0"/>
+              <a:rPr lang="en-US" sz="900" kern="1200" baseline="0" dirty="0">
+                <a:solidFill>
+                  <a:schemeClr val="tx1"/>
+                </a:solidFill>
+                <a:latin typeface="+mn-lt"/>
+                <a:ea typeface="+mn-ea"/>
+                <a:cs typeface="+mn-cs"/>
+              </a:rPr>
               <a:t>CVE is sponsored by </a:t>
             </a:r>
             <a:r>
-              <a:rPr lang="en-US" sz="900" dirty="0">
+              <a:rPr lang="en-US" sz="900" kern="1200" baseline="0" dirty="0">
+                <a:solidFill>
+                  <a:schemeClr val="tx1"/>
+                </a:solidFill>
+                <a:latin typeface="+mn-lt"/>
+                <a:ea typeface="+mn-ea"/>
+                <a:cs typeface="+mn-cs"/>
                 <a:hlinkClick r:id="rId3"/>
               </a:rPr>
-              <a:t>NSD</a:t>
-            </a:r>
-            <a:r>
-              <a:rPr lang="en-US" sz="900" dirty="0"/>
-              <a:t>, </a:t>
-            </a:r>
-            <a:r>
-              <a:rPr lang="en-US" sz="900" dirty="0">
+              <a:t>US-CERT</a:t>
+            </a:r>
+            <a:r>
+              <a:rPr lang="en-US" sz="900" kern="1200" baseline="0" dirty="0">
+                <a:solidFill>
+                  <a:schemeClr val="tx1"/>
+                </a:solidFill>
+                <a:latin typeface="+mn-lt"/>
+                <a:ea typeface="+mn-ea"/>
+                <a:cs typeface="+mn-cs"/>
+              </a:rPr>
+              <a:t> in the office of </a:t>
+            </a:r>
+            <a:r>
+              <a:rPr lang="en-US" sz="900" kern="1200" baseline="0" dirty="0">
+                <a:solidFill>
+                  <a:schemeClr val="tx1"/>
+                </a:solidFill>
+                <a:latin typeface="+mn-lt"/>
+                <a:ea typeface="+mn-ea"/>
+                <a:cs typeface="+mn-cs"/>
                 <a:hlinkClick r:id="rId4"/>
               </a:rPr>
-              <a:t>NCCIC</a:t>
-            </a:r>
-            <a:r>
-              <a:rPr lang="en-US" sz="900" dirty="0"/>
-              <a:t> in </a:t>
-            </a:r>
-            <a:r>
-              <a:rPr lang="en-US" sz="900" dirty="0">
+              <a:t>Cybersecurity and Communications </a:t>
+            </a:r>
+            <a:r>
+              <a:rPr lang="en-US" sz="900" kern="1200" baseline="0" dirty="0">
+                <a:solidFill>
+                  <a:schemeClr val="tx1"/>
+                </a:solidFill>
+                <a:latin typeface="+mn-lt"/>
+                <a:ea typeface="+mn-ea"/>
+                <a:cs typeface="+mn-cs"/>
+              </a:rPr>
+              <a:t>at the </a:t>
+            </a:r>
+            <a:r>
+              <a:rPr lang="en-US" sz="900" kern="1200" baseline="0" dirty="0">
+                <a:solidFill>
+                  <a:schemeClr val="tx1"/>
+                </a:solidFill>
+                <a:latin typeface="+mn-lt"/>
+                <a:ea typeface="+mn-ea"/>
+                <a:cs typeface="+mn-cs"/>
                 <a:hlinkClick r:id="rId5"/>
               </a:rPr>
-              <a:t>CISA</a:t>
-            </a:r>
-            <a:r>
-              <a:rPr lang="en-US" sz="900" dirty="0"/>
-              <a:t>’s Cybersecurity Division at the </a:t>
-            </a:r>
-            <a:r>
-              <a:rPr lang="en-US" sz="900" dirty="0">
+              <a:t>U.S. Department of Homeland Security</a:t>
+            </a:r>
+            <a:r>
+              <a:rPr lang="en-US" sz="900" kern="1200" baseline="0" dirty="0">
+                <a:solidFill>
+                  <a:schemeClr val="tx1"/>
+                </a:solidFill>
+                <a:latin typeface="+mn-lt"/>
+                <a:ea typeface="+mn-ea"/>
+                <a:cs typeface="+mn-cs"/>
+              </a:rPr>
+              <a:t>. Copyright © 1999–2018, </a:t>
+            </a:r>
+            <a:r>
+              <a:rPr lang="en-US" sz="900" kern="1200" baseline="0" dirty="0">
+                <a:solidFill>
+                  <a:schemeClr val="tx1"/>
+                </a:solidFill>
+                <a:latin typeface="+mn-lt"/>
+                <a:ea typeface="+mn-ea"/>
+                <a:cs typeface="+mn-cs"/>
                 <a:hlinkClick r:id="rId6"/>
               </a:rPr>
-              <a:t>U.S. Department of Homeland Security</a:t>
-            </a:r>
-            <a:r>
-              <a:rPr lang="en-US" sz="900" dirty="0"/>
-              <a:t>. Copyright © 1999–2019, </a:t>
-            </a:r>
-            <a:r>
-              <a:rPr lang="en-US" sz="900" dirty="0">
-                <a:hlinkClick r:id="rId7"/>
+              <a:t>The MITRE Corporation</a:t>
+            </a:r>
+            <a:r>
+              <a:rPr lang="en-US" sz="900" kern="1200" baseline="0" dirty="0">
+                <a:solidFill>
+                  <a:schemeClr val="tx1"/>
+                </a:solidFill>
+                <a:latin typeface="+mn-lt"/>
+                <a:ea typeface="+mn-ea"/>
+                <a:cs typeface="+mn-cs"/>
               </a:rPr>
-              <a:t>The MITRE Corporation</a:t>
-            </a:r>
-            <a:r>
-              <a:rPr lang="en-US" sz="900" dirty="0"/>
-              <a:t>. CVE and the CVE logo are registered trademarks of The MITRE Corporation.</a:t>
+              <a:t>. CVE and the CVE logo are registered trademarks and CVE-Compatible is a trademark of The MITRE Corporation.</a:t>
             </a:r>
             <a:endParaRPr lang="en-US" altLang="en-US" sz="900" b="0" u="none" baseline="0" dirty="0">
               <a:solidFill>
@@ -3442,6 +3539,95 @@
               </a:solidFill>
               <a:cs typeface="+mn-cs"/>
             </a:endParaRPr>
+          </a:p>
+        </p:txBody>
+      </p:sp>
+      <p:pic>
+        <p:nvPicPr>
+          <p:cNvPr id="16" name="Picture 15"/>
+          <p:cNvPicPr>
+            <a:picLocks noChangeAspect="1"/>
+          </p:cNvPicPr>
+          <p:nvPr/>
+        </p:nvPicPr>
+        <p:blipFill>
+          <a:blip r:embed="rId2">
+            <a:extLst>
+              <a:ext uri="{28A0092B-C50C-407E-A947-70E740481C1C}">
+                <a14:useLocalDpi xmlns:a14="http://schemas.microsoft.com/office/drawing/2010/main" val="0"/>
+              </a:ext>
+            </a:extLst>
+          </a:blip>
+          <a:stretch>
+            <a:fillRect/>
+          </a:stretch>
+        </p:blipFill>
+        <p:spPr>
+          <a:xfrm>
+            <a:off x="5409764" y="267886"/>
+            <a:ext cx="1101840" cy="521537"/>
+          </a:xfrm>
+          <a:prstGeom prst="rect">
+            <a:avLst/>
+          </a:prstGeom>
+        </p:spPr>
+      </p:pic>
+      <p:sp>
+        <p:nvSpPr>
+          <p:cNvPr id="19" name="TextBox 18"/>
+          <p:cNvSpPr txBox="1"/>
+          <p:nvPr/>
+        </p:nvSpPr>
+        <p:spPr>
+          <a:xfrm>
+            <a:off x="6511605" y="175177"/>
+            <a:ext cx="2518816" cy="584775"/>
+          </a:xfrm>
+          <a:prstGeom prst="rect">
+            <a:avLst/>
+          </a:prstGeom>
+          <a:solidFill>
+            <a:schemeClr val="bg1"/>
+          </a:solidFill>
+        </p:spPr>
+        <p:txBody>
+          <a:bodyPr wrap="square" rtlCol="0">
+            <a:spAutoFit/>
+          </a:bodyPr>
+          <a:lstStyle/>
+          <a:p>
+            <a:pPr>
+              <a:spcAft>
+                <a:spcPts val="0"/>
+              </a:spcAft>
+            </a:pPr>
+            <a:r>
+              <a:rPr lang="en-US" sz="1600" b="1" baseline="0" dirty="0">
+                <a:solidFill>
+                  <a:srgbClr val="650800"/>
+                </a:solidFill>
+                <a:ea typeface="Verdana" pitchFamily="34" charset="0"/>
+                <a:cs typeface="Verdana" pitchFamily="34" charset="0"/>
+              </a:rPr>
+              <a:t>Common Vulnerabilities </a:t>
+            </a:r>
+          </a:p>
+          <a:p>
+            <a:pPr>
+              <a:spcAft>
+                <a:spcPts val="0"/>
+              </a:spcAft>
+            </a:pPr>
+            <a:r>
+              <a:rPr lang="en-US" sz="1600" b="1" baseline="0" dirty="0">
+                <a:solidFill>
+                  <a:srgbClr val="650800"/>
+                </a:solidFill>
+                <a:ea typeface="Verdana" pitchFamily="34" charset="0"/>
+                <a:cs typeface="Verdana" pitchFamily="34" charset="0"/>
+              </a:rPr>
+              <a:t>and Exposures</a:t>
+            </a:r>
           </a:p>
         </p:txBody>
       </p:sp>
@@ -4785,19 +4971,76 @@
           </a:p>
         </p:txBody>
       </p:sp>
+      <p:sp>
+        <p:nvSpPr>
+          <p:cNvPr id="16" name="Text Box 34"/>
+          <p:cNvSpPr txBox="1">
+            <a:spLocks noChangeArrowheads="1"/>
+          </p:cNvSpPr>
+          <p:nvPr/>
+        </p:nvSpPr>
+        <p:spPr bwMode="auto">
+          <a:xfrm>
+            <a:off x="5348546" y="6440782"/>
+            <a:ext cx="3525723" cy="307777"/>
+          </a:xfrm>
+          <a:prstGeom prst="rect">
+            <a:avLst/>
+          </a:prstGeom>
+          <a:noFill/>
+          <a:ln w="9525">
+            <a:noFill/>
+            <a:miter lim="800000"/>
+            <a:headEnd/>
+            <a:tailEnd/>
+          </a:ln>
+          <a:effectLst/>
+        </p:spPr>
+        <p:txBody>
+          <a:bodyPr wrap="square" lIns="45720" rIns="45720">
+            <a:spAutoFit/>
+          </a:bodyPr>
+          <a:lstStyle/>
+          <a:p>
+            <a:pPr algn="r" eaLnBrk="0" hangingPunct="0">
+              <a:defRPr/>
+            </a:pPr>
+            <a:r>
+              <a:rPr lang="en-US" altLang="en-US" sz="700" b="0" dirty="0">
+                <a:cs typeface="+mn-cs"/>
+              </a:rPr>
+              <a:t>HSSEDI is a trademark of the U.S. Department of Homeland Security (DHS).</a:t>
+            </a:r>
+          </a:p>
+          <a:p>
+            <a:pPr algn="r" eaLnBrk="0" hangingPunct="0">
+              <a:defRPr/>
+            </a:pPr>
+            <a:r>
+              <a:rPr lang="en-US" altLang="en-US" sz="700" b="0" dirty="0">
+                <a:cs typeface="+mn-cs"/>
+              </a:rPr>
+              <a:t>The HSSEDI FFRDC is managed and operated by The MITRE</a:t>
+            </a:r>
+            <a:r>
+              <a:rPr lang="en-US" altLang="en-US" sz="700" b="0" baseline="0" dirty="0">
+                <a:cs typeface="+mn-cs"/>
+              </a:rPr>
+              <a:t> Corporation for DHS.</a:t>
+            </a:r>
+            <a:endParaRPr lang="en-US" altLang="en-US" sz="700" b="0" dirty="0">
+              <a:cs typeface="+mn-cs"/>
+            </a:endParaRPr>
+          </a:p>
+        </p:txBody>
+      </p:sp>
       <p:pic>
         <p:nvPicPr>
-          <p:cNvPr id="12" name="Picture 11">
-            <a:extLst>
-              <a:ext uri="{FF2B5EF4-FFF2-40B4-BE49-F238E27FC236}">
-                <a16:creationId xmlns:a16="http://schemas.microsoft.com/office/drawing/2014/main" id="{07394CE1-E2AB-4A29-B42E-038DE498B386}"/>
-              </a:ext>
-            </a:extLst>
-          </p:cNvPr>
+          <p:cNvPr id="11" name="Picture 10"/>
           <p:cNvPicPr>
             <a:picLocks noChangeAspect="1"/>
           </p:cNvPicPr>
-          <p:nvPr userDrawn="1"/>
+          <p:nvPr/>
         </p:nvPicPr>
         <p:blipFill>
           <a:blip r:embed="rId2">
@@ -4813,117 +5056,44 @@
         </p:blipFill>
         <p:spPr>
           <a:xfrm>
-            <a:off x="618308" y="6209056"/>
-            <a:ext cx="1177735" cy="634662"/>
+            <a:off x="535564" y="6298118"/>
+            <a:ext cx="904929" cy="428333"/>
           </a:xfrm>
           <a:prstGeom prst="rect">
             <a:avLst/>
           </a:prstGeom>
         </p:spPr>
       </p:pic>
-      <p:sp>
-        <p:nvSpPr>
-          <p:cNvPr id="15" name="Text Box 34">
+      <p:pic>
+        <p:nvPicPr>
+          <p:cNvPr id="17" name="Picture 16"/>
+          <p:cNvPicPr>
+            <a:picLocks noChangeAspect="1"/>
+          </p:cNvPicPr>
+          <p:nvPr/>
+        </p:nvPicPr>
+        <p:blipFill>
+          <a:blip r:embed="rId2">
             <a:extLst>
-              <a:ext uri="{FF2B5EF4-FFF2-40B4-BE49-F238E27FC236}">
-                <a16:creationId xmlns:a16="http://schemas.microsoft.com/office/drawing/2014/main" id="{B7A11BEE-A997-469D-B76F-5952F59A1300}"/>
+              <a:ext uri="{28A0092B-C50C-407E-A947-70E740481C1C}">
+                <a14:useLocalDpi xmlns:a14="http://schemas.microsoft.com/office/drawing/2010/main" val="0"/>
               </a:ext>
             </a:extLst>
-          </p:cNvPr>
-          <p:cNvSpPr txBox="1">
-            <a:spLocks noChangeArrowheads="1"/>
-          </p:cNvSpPr>
-          <p:nvPr userDrawn="1"/>
-        </p:nvSpPr>
-        <p:spPr bwMode="auto">
+          </a:blip>
+          <a:stretch>
+            <a:fillRect/>
+          </a:stretch>
+        </p:blipFill>
+        <p:spPr>
           <a:xfrm>
-            <a:off x="2489982" y="6353061"/>
-            <a:ext cx="6430416" cy="369332"/>
+            <a:off x="7737360" y="523844"/>
+            <a:ext cx="1101840" cy="521537"/>
           </a:xfrm>
           <a:prstGeom prst="rect">
             <a:avLst/>
           </a:prstGeom>
-          <a:noFill/>
-          <a:ln w="9525">
-            <a:noFill/>
-            <a:miter lim="800000"/>
-            <a:headEnd/>
-            <a:tailEnd/>
-          </a:ln>
-          <a:effectLst/>
         </p:spPr>
-        <p:txBody>
-          <a:bodyPr wrap="square" lIns="45720" rIns="45720">
-            <a:spAutoFit/>
-          </a:bodyPr>
-          <a:lstStyle/>
-          <a:p>
-            <a:pPr algn="l" eaLnBrk="0" hangingPunct="0">
-              <a:defRPr/>
-            </a:pPr>
-            <a:r>
-              <a:rPr lang="en-US" sz="900" dirty="0"/>
-              <a:t>CVE is sponsored by </a:t>
-            </a:r>
-            <a:r>
-              <a:rPr lang="en-US" sz="900" dirty="0">
-                <a:hlinkClick r:id="rId3"/>
-              </a:rPr>
-              <a:t>NSD</a:t>
-            </a:r>
-            <a:r>
-              <a:rPr lang="en-US" sz="900" dirty="0"/>
-              <a:t>, </a:t>
-            </a:r>
-            <a:r>
-              <a:rPr lang="en-US" sz="900" dirty="0">
-                <a:hlinkClick r:id="rId4"/>
-              </a:rPr>
-              <a:t>NCCIC</a:t>
-            </a:r>
-            <a:r>
-              <a:rPr lang="en-US" sz="900" dirty="0"/>
-              <a:t> in </a:t>
-            </a:r>
-            <a:r>
-              <a:rPr lang="en-US" sz="900" dirty="0">
-                <a:hlinkClick r:id="rId5"/>
-              </a:rPr>
-              <a:t>CISA</a:t>
-            </a:r>
-            <a:r>
-              <a:rPr lang="en-US" sz="900" dirty="0"/>
-              <a:t>’s Cybersecurity Division at the </a:t>
-            </a:r>
-            <a:r>
-              <a:rPr lang="en-US" sz="900" dirty="0">
-                <a:hlinkClick r:id="rId6"/>
-              </a:rPr>
-              <a:t>U.S. Department of Homeland Security</a:t>
-            </a:r>
-            <a:r>
-              <a:rPr lang="en-US" sz="900" dirty="0"/>
-              <a:t>. Copyright © 1999–2019, </a:t>
-            </a:r>
-            <a:r>
-              <a:rPr lang="en-US" sz="900" dirty="0">
-                <a:hlinkClick r:id="rId7"/>
-              </a:rPr>
-              <a:t>The MITRE Corporation</a:t>
-            </a:r>
-            <a:r>
-              <a:rPr lang="en-US" sz="900" dirty="0"/>
-              <a:t>. CVE and the CVE logo are registered trademarks of The MITRE Corporation.</a:t>
-            </a:r>
-            <a:endParaRPr lang="en-US" altLang="en-US" sz="900" b="0" u="none" baseline="0" dirty="0">
-              <a:solidFill>
-                <a:schemeClr val="tx1"/>
-              </a:solidFill>
-              <a:cs typeface="+mn-cs"/>
-            </a:endParaRPr>
-          </a:p>
-        </p:txBody>
-      </p:sp>
+      </p:pic>
     </p:spTree>
     <p:extLst>
       <p:ext uri="{BB962C8B-B14F-4D97-AF65-F5344CB8AC3E}">
@@ -5276,17 +5446,11 @@
       </p:sp>
       <p:pic>
         <p:nvPicPr>
-          <p:cNvPr id="17" name="Picture 16">
-            <a:extLst>
-              <a:ext uri="{FF2B5EF4-FFF2-40B4-BE49-F238E27FC236}">
-                <a16:creationId xmlns:a16="http://schemas.microsoft.com/office/drawing/2014/main" id="{56EF5739-884D-4290-84F5-80B14D711888}"/>
-              </a:ext>
-            </a:extLst>
-          </p:cNvPr>
+          <p:cNvPr id="14" name="Picture 13"/>
           <p:cNvPicPr>
             <a:picLocks noChangeAspect="1"/>
           </p:cNvPicPr>
-          <p:nvPr userDrawn="1"/>
+          <p:nvPr/>
         </p:nvPicPr>
         <p:blipFill>
           <a:blip r:embed="rId11">
@@ -5302,32 +5466,56 @@
         </p:blipFill>
         <p:spPr>
           <a:xfrm>
-            <a:off x="618308" y="6209056"/>
-            <a:ext cx="1177735" cy="634662"/>
+            <a:off x="7737360" y="523844"/>
+            <a:ext cx="1101840" cy="521537"/>
           </a:xfrm>
           <a:prstGeom prst="rect">
             <a:avLst/>
           </a:prstGeom>
         </p:spPr>
       </p:pic>
-      <p:sp>
-        <p:nvSpPr>
-          <p:cNvPr id="18" name="Text Box 34">
+      <p:pic>
+        <p:nvPicPr>
+          <p:cNvPr id="16" name="Picture 15"/>
+          <p:cNvPicPr>
+            <a:picLocks noChangeAspect="1"/>
+          </p:cNvPicPr>
+          <p:nvPr/>
+        </p:nvPicPr>
+        <p:blipFill>
+          <a:blip r:embed="rId11">
             <a:extLst>
-              <a:ext uri="{FF2B5EF4-FFF2-40B4-BE49-F238E27FC236}">
-                <a16:creationId xmlns:a16="http://schemas.microsoft.com/office/drawing/2014/main" id="{9C6BB7A0-3841-49D6-B199-AAA133423694}"/>
+              <a:ext uri="{28A0092B-C50C-407E-A947-70E740481C1C}">
+                <a14:useLocalDpi xmlns:a14="http://schemas.microsoft.com/office/drawing/2010/main" val="0"/>
               </a:ext>
             </a:extLst>
-          </p:cNvPr>
+          </a:blip>
+          <a:stretch>
+            <a:fillRect/>
+          </a:stretch>
+        </p:blipFill>
+        <p:spPr>
+          <a:xfrm>
+            <a:off x="535564" y="6298118"/>
+            <a:ext cx="904929" cy="428333"/>
+          </a:xfrm>
+          <a:prstGeom prst="rect">
+            <a:avLst/>
+          </a:prstGeom>
+        </p:spPr>
+      </p:pic>
+      <p:sp>
+        <p:nvSpPr>
+          <p:cNvPr id="19" name="Text Box 34"/>
           <p:cNvSpPr txBox="1">
             <a:spLocks noChangeArrowheads="1"/>
           </p:cNvSpPr>
-          <p:nvPr userDrawn="1"/>
+          <p:nvPr/>
         </p:nvSpPr>
         <p:spPr bwMode="auto">
           <a:xfrm>
-            <a:off x="2489982" y="6353061"/>
-            <a:ext cx="6430416" cy="369332"/>
+            <a:off x="3845490" y="6256122"/>
+            <a:ext cx="5184930" cy="507831"/>
           </a:xfrm>
           <a:prstGeom prst="rect">
             <a:avLst/>
@@ -5347,62 +5535,111 @@
           </a:bodyPr>
           <a:lstStyle/>
           <a:p>
-            <a:pPr algn="l" eaLnBrk="0" hangingPunct="0">
+            <a:pPr algn="r" eaLnBrk="0" hangingPunct="0">
               <a:defRPr/>
             </a:pPr>
             <a:r>
-              <a:rPr lang="en-US" sz="900" dirty="0"/>
+              <a:rPr lang="en-US" sz="900" kern="1200" baseline="0" dirty="0">
+                <a:solidFill>
+                  <a:schemeClr val="tx1"/>
+                </a:solidFill>
+                <a:latin typeface="+mn-lt"/>
+                <a:ea typeface="+mn-ea"/>
+                <a:cs typeface="+mn-cs"/>
+              </a:rPr>
               <a:t>CVE is sponsored by </a:t>
             </a:r>
             <a:r>
-              <a:rPr lang="en-US" sz="900" dirty="0">
+              <a:rPr lang="en-US" sz="900" kern="1200" baseline="0" dirty="0">
+                <a:solidFill>
+                  <a:schemeClr val="tx1"/>
+                </a:solidFill>
+                <a:latin typeface="+mn-lt"/>
+                <a:ea typeface="+mn-ea"/>
+                <a:cs typeface="+mn-cs"/>
                 <a:hlinkClick r:id="rId12"/>
               </a:rPr>
-              <a:t>NSD</a:t>
-            </a:r>
-            <a:r>
-              <a:rPr lang="en-US" sz="900" dirty="0"/>
-              <a:t>, </a:t>
-            </a:r>
-            <a:r>
-              <a:rPr lang="en-US" sz="900" dirty="0">
+              <a:t>US-CERT</a:t>
+            </a:r>
+            <a:r>
+              <a:rPr lang="en-US" sz="900" kern="1200" baseline="0" dirty="0">
+                <a:solidFill>
+                  <a:schemeClr val="tx1"/>
+                </a:solidFill>
+                <a:latin typeface="+mn-lt"/>
+                <a:ea typeface="+mn-ea"/>
+                <a:cs typeface="+mn-cs"/>
+              </a:rPr>
+              <a:t> in the office of </a:t>
+            </a:r>
+            <a:r>
+              <a:rPr lang="en-US" sz="900" kern="1200" baseline="0" dirty="0">
+                <a:solidFill>
+                  <a:schemeClr val="tx1"/>
+                </a:solidFill>
+                <a:latin typeface="+mn-lt"/>
+                <a:ea typeface="+mn-ea"/>
+                <a:cs typeface="+mn-cs"/>
                 <a:hlinkClick r:id="rId13"/>
               </a:rPr>
-              <a:t>NCCIC</a:t>
-            </a:r>
-            <a:r>
-              <a:rPr lang="en-US" sz="900" dirty="0"/>
-              <a:t> in </a:t>
-            </a:r>
-            <a:r>
-              <a:rPr lang="en-US" sz="900" dirty="0">
+              <a:t>Cybersecurity and Communications </a:t>
+            </a:r>
+            <a:r>
+              <a:rPr lang="en-US" sz="900" kern="1200" baseline="0" dirty="0">
+                <a:solidFill>
+                  <a:schemeClr val="tx1"/>
+                </a:solidFill>
+                <a:latin typeface="+mn-lt"/>
+                <a:ea typeface="+mn-ea"/>
+                <a:cs typeface="+mn-cs"/>
+              </a:rPr>
+              <a:t>at the </a:t>
+            </a:r>
+            <a:r>
+              <a:rPr lang="en-US" sz="900" kern="1200" baseline="0" dirty="0">
+                <a:solidFill>
+                  <a:schemeClr val="tx1"/>
+                </a:solidFill>
+                <a:latin typeface="+mn-lt"/>
+                <a:ea typeface="+mn-ea"/>
+                <a:cs typeface="+mn-cs"/>
                 <a:hlinkClick r:id="rId14"/>
               </a:rPr>
-              <a:t>CISA</a:t>
-            </a:r>
-            <a:r>
-              <a:rPr lang="en-US" sz="900" dirty="0"/>
-              <a:t>’s Cybersecurity Division at the </a:t>
-            </a:r>
-            <a:r>
-              <a:rPr lang="en-US" sz="900" dirty="0">
+              <a:t>U.S. Department of Homeland Security</a:t>
+            </a:r>
+            <a:r>
+              <a:rPr lang="en-US" sz="900" kern="1200" baseline="0" dirty="0">
+                <a:solidFill>
+                  <a:schemeClr val="tx1"/>
+                </a:solidFill>
+                <a:latin typeface="+mn-lt"/>
+                <a:ea typeface="+mn-ea"/>
+                <a:cs typeface="+mn-cs"/>
+              </a:rPr>
+              <a:t>. Copyright © 1999–2018, </a:t>
+            </a:r>
+            <a:r>
+              <a:rPr lang="en-US" sz="900" kern="1200" baseline="0" dirty="0">
+                <a:solidFill>
+                  <a:schemeClr val="tx1"/>
+                </a:solidFill>
+                <a:latin typeface="+mn-lt"/>
+                <a:ea typeface="+mn-ea"/>
+                <a:cs typeface="+mn-cs"/>
                 <a:hlinkClick r:id="rId15"/>
               </a:rPr>
-              <a:t>U.S. Department of Homeland Security</a:t>
-            </a:r>
-            <a:r>
-              <a:rPr lang="en-US" sz="900" dirty="0"/>
-              <a:t>. Copyright © 1999–2019, </a:t>
-            </a:r>
-            <a:r>
-              <a:rPr lang="en-US" sz="900" dirty="0">
-                <a:hlinkClick r:id="rId16"/>
+              <a:t>The MITRE Corporation</a:t>
+            </a:r>
+            <a:r>
+              <a:rPr lang="en-US" sz="900" kern="1200" baseline="0" dirty="0">
+                <a:solidFill>
+                  <a:schemeClr val="tx1"/>
+                </a:solidFill>
+                <a:latin typeface="+mn-lt"/>
+                <a:ea typeface="+mn-ea"/>
+                <a:cs typeface="+mn-cs"/>
               </a:rPr>
-              <a:t>The MITRE Corporation</a:t>
-            </a:r>
-            <a:r>
-              <a:rPr lang="en-US" sz="900" dirty="0"/>
-              <a:t>. CVE and the CVE logo are registered trademarks of The MITRE Corporation.</a:t>
+              <a:t>. CVE and the CVE logo are registered trademarks and CVE-Compatible is a trademark of The MITRE Corporation.</a:t>
             </a:r>
             <a:endParaRPr lang="en-US" altLang="en-US" sz="900" b="0" u="none" baseline="0" dirty="0">
               <a:solidFill>
@@ -5878,7 +6115,7 @@
             <a:pPr lvl="1"/>
             <a:r>
               <a:rPr lang="en-US" dirty="0"/>
-              <a:t>Within Dell, the Dell CNA covers Dell, EMC products, and the products of many of their subsidiary companies; however, they do not cover VMware, which has its own CNA program</a:t>
+              <a:t>Within Dell, the Dell EMC CNA covers Dell, EMC products, and the products of many of their subsidiary companies; however, they do not cover VMware, which has its own CNA program</a:t>
             </a:r>
           </a:p>
         </p:txBody>
@@ -6282,8 +6519,13 @@
             <a:pPr lvl="1"/>
             <a:r>
               <a:rPr lang="en-US" dirty="0"/>
-              <a:t>e.g., Rapid7</a:t>
-            </a:r>
+              <a:t>e.g., Rapid 7, </a:t>
+            </a:r>
+            <a:r>
+              <a:rPr lang="en-US" dirty="0" err="1"/>
+              <a:t>IOActive</a:t>
+            </a:r>
+            <a:endParaRPr lang="en-US" dirty="0"/>
           </a:p>
           <a:p>
             <a:r>
@@ -6295,7 +6537,15 @@
             <a:pPr lvl="1"/>
             <a:r>
               <a:rPr lang="en-US" dirty="0"/>
-              <a:t>e.g., Flexera (vendor and research), Drupal (vendor and coordinator)</a:t>
+              <a:t>e.g., </a:t>
+            </a:r>
+            <a:r>
+              <a:rPr lang="en-US" dirty="0" err="1"/>
+              <a:t>Flexera</a:t>
+            </a:r>
+            <a:r>
+              <a:rPr lang="en-US" dirty="0"/>
+              <a:t> (vendor and research), Drupal (vendor and coordinator)</a:t>
             </a:r>
           </a:p>
           <a:p>
@@ -6396,7 +6646,7 @@
           <a:p>
             <a:r>
               <a:rPr lang="en-US" dirty="0"/>
-              <a:t>All advisories must meet the CVE Program’s requirements for being published:</a:t>
+              <a:t>All advisories must meet CVE’s requirements for being published:</a:t>
             </a:r>
           </a:p>
           <a:p>
@@ -6417,7 +6667,7 @@
             <a:pPr lvl="1"/>
             <a:r>
               <a:rPr lang="en-US" dirty="0"/>
-              <a:t>The document linked to the URL must contain the minimum required information for a CVE Entry:</a:t>
+              <a:t>The document linked to the URL must contain the minimum required information for a CVE entry:</a:t>
             </a:r>
           </a:p>
           <a:p>
@@ -6828,12 +7078,7 @@
             <p:ph idx="1"/>
           </p:nvPr>
         </p:nvSpPr>
-        <p:spPr>
-          <a:xfrm>
-            <a:off x="609600" y="1447800"/>
-            <a:ext cx="8229600" cy="4589745"/>
-          </a:xfrm>
-        </p:spPr>
+        <p:spPr/>
         <p:txBody>
           <a:bodyPr>
             <a:normAutofit lnSpcReduction="10000"/>
@@ -6862,7 +7107,7 @@
             <a:pPr lvl="1"/>
             <a:r>
               <a:rPr lang="en-US" dirty="0"/>
-              <a:t>A registry of contact information is maintained on the CVE Program website [1]</a:t>
+              <a:t>A registry of contact information is maintained on MITRE’s site [1]</a:t>
             </a:r>
           </a:p>
           <a:p>
@@ -6895,17 +7140,7 @@
           <a:p>
             <a:r>
               <a:rPr lang="en-US" dirty="0"/>
-              <a:t>[1] </a:t>
-            </a:r>
-            <a:r>
-              <a:rPr lang="en-US" dirty="0">
-                <a:hlinkClick r:id="rId3"/>
-              </a:rPr>
-              <a:t>https://cve.mitre.org/cve/request_id.html#cna_coverage.html</a:t>
-            </a:r>
-            <a:r>
-              <a:rPr lang="en-US" dirty="0"/>
-              <a:t> </a:t>
+              <a:t>[1] http://cve.mitre.org/cve/request_id.html#cna_coverage.html</a:t>
             </a:r>
           </a:p>
           <a:p>
@@ -7390,13 +7625,13 @@
           <a:p>
             <a:r>
               <a:rPr lang="en-US" dirty="0"/>
-              <a:t>CNAs will receive requests to update CVE Entries that have been created; a process should be established to handle these requests</a:t>
-            </a:r>
-          </a:p>
-          <a:p>
-            <a:r>
-              <a:rPr lang="en-US" dirty="0"/>
-              <a:t>If the request to update a CVE Entry is sent to a Root CNA or the Program Root CNA, the issuing CNA should decide if they want to be notified.</a:t>
+              <a:t>CNAs will receive requests to update CVE entries that have been created; a process should be established to handle these requests</a:t>
+            </a:r>
+          </a:p>
+          <a:p>
+            <a:r>
+              <a:rPr lang="en-US" dirty="0"/>
+              <a:t>If the request to update a CVE entry is sent to a Root CNA or the Primary CNA, the issuing CNA should decide if they want to be notified.</a:t>
             </a:r>
           </a:p>
           <a:p>
@@ -7520,22 +7755,26 @@
             </a:br>
             <a:r>
               <a:rPr lang="en-US" dirty="0"/>
-              <a:t>Rationale: This gives an idea of how much vulnerability disclosure activity there is in each CNA, which can then be extrapolated to sectors or some other category of CNA.</a:t>
+              <a:t>Rationale: This gives an idea of how much vulnerability disclosure activity there is in each CNA which can then be extrapolated to sectors or some other category of CNA.</a:t>
             </a:r>
           </a:p>
           <a:p>
             <a:pPr lvl="2"/>
             <a:r>
               <a:rPr lang="en-US" dirty="0"/>
-              <a:t>Average time between assignment of CVE ID and publication of CVE Entry</a:t>
+              <a:t>Average time between assignment of CVE ID and publication of CVE ID entry</a:t>
             </a:r>
             <a:br>
               <a:rPr lang="en-US" dirty="0"/>
             </a:br>
             <a:r>
               <a:rPr lang="en-US" dirty="0"/>
-              <a:t>Rationale: Again, taken in aggregate, gives an idea for what the common timeframes are, which can inform discussions of best practice.</a:t>
-            </a:r>
+              <a:t>Rationale: Again, taken in aggregate, gives an idea for what the common time frames are, which can inform discussions of best practice.</a:t>
+            </a:r>
+          </a:p>
+          <a:p>
+            <a:pPr lvl="2"/>
+            <a:endParaRPr lang="en-US" dirty="0"/>
           </a:p>
         </p:txBody>
       </p:sp>
@@ -8000,15 +8239,7 @@
             <a:pPr lvl="1"/>
             <a:r>
               <a:rPr lang="en-US" dirty="0"/>
-              <a:t>A </a:t>
-            </a:r>
-            <a:r>
-              <a:rPr lang="en-US" i="1" dirty="0"/>
-              <a:t>CNA Rules </a:t>
-            </a:r>
-            <a:r>
-              <a:rPr lang="en-US" dirty="0"/>
-              <a:t>review</a:t>
+              <a:t>A CNA Rules review</a:t>
             </a:r>
           </a:p>
           <a:p>
@@ -8048,7 +8279,7 @@
             <a:pPr lvl="1"/>
             <a:r>
               <a:rPr lang="en-US" dirty="0"/>
-              <a:t>Program Root CNA (currently MITRE) can help provide supplemental material</a:t>
+              <a:t>MITRE can help provide supplemental material</a:t>
             </a:r>
           </a:p>
         </p:txBody>
@@ -8397,7 +8628,7 @@
             </a:pPr>
             <a:r>
               <a:rPr lang="en-US" dirty="0"/>
-              <a:t>The following rules apply to all CNAs when assigning CVE IDs to vulnerabilities:</a:t>
+              <a:t>The following rules apply to all CNAs when assigning CVEs to vulnerabilities:</a:t>
             </a:r>
           </a:p>
           <a:p>
@@ -8419,7 +8650,7 @@
             </a:pPr>
             <a:r>
               <a:rPr lang="en-US" dirty="0"/>
-              <a:t>Only assign CVE IDs to security vulnerabilities when no lower level CNA exists that already covers a more constrained scope (this may require coordination)</a:t>
+              <a:t>Only assign CVE IDs to security vulnerabilities when no lower level CNA exists which already covers a more constrained scope (this may require coordination)</a:t>
             </a:r>
           </a:p>
           <a:p>
@@ -8430,7 +8661,7 @@
             </a:pPr>
             <a:r>
               <a:rPr lang="en-US" dirty="0"/>
-              <a:t>Follow CVE counting rules established by the CVE Program as implemented by the Program Root CNA and augmented by Root CNAs and Sub-CNAs if applicable</a:t>
+              <a:t>Follow CVE counting rules established by the CVE Program as implemented by the Primary CNA and augmented by Root CNAs and Sub-CNAs if applicable</a:t>
             </a:r>
           </a:p>
           <a:p>
@@ -8588,7 +8819,7 @@
             <a:pPr lvl="1"/>
             <a:r>
               <a:rPr lang="en-US" dirty="0"/>
-              <a:t>If a CNA accepts requests from parties outside the CNA, provide a means (e.g., hyperlink, email) for the public to contact them regarding vulnerabilities. CNAs can also provide guidelines for how to communicate with them, such as language restrictions (“English-only”, “Japanese or English”, etc.). Provide the list publicly and to all levels above their own</a:t>
+              <a:t>If a CNA accepts requests from parties outside the CNA, provide a means (e.g., hyperlink, e-mail) for the public to contact them regarding vulnerabilities. CNAs can also provide guidelines for how to communicate with them, such as language restrictions (“English-only”, “Japanese or English”, etc.). Provide the list publicly and to all levels above their own</a:t>
             </a:r>
           </a:p>
           <a:p>
@@ -8719,7 +8950,7 @@
             </a:pPr>
             <a:r>
               <a:rPr lang="en-US" dirty="0"/>
-              <a:t>Notify the next higher level CNA when CVE IDs are assigned and the associated vulnerability is made public (the publication of the vulnerability can be made in any language, but the CVE ID entry must include English only; references to information related to the CVE ID in non-English languages would be included in the reference list for the CVE ID entry)</a:t>
+              <a:t>Notify the next higher level CNA when CVEs are assigned and the associated vulnerability is made public (the publication of the vulnerability can be made in any language, but the CVE ID entry must include English only; references to information related to the CVE ID in non-English languages would be included in the reference list for the CVE ID entry)</a:t>
             </a:r>
           </a:p>
           <a:p>
@@ -8730,7 +8961,7 @@
             </a:pPr>
             <a:r>
               <a:rPr lang="en-US" dirty="0"/>
-              <a:t>Provide CVE information to the next higher-level CNA when a CVE ID is assigned and the associated vulnerability made public </a:t>
+              <a:t>Provide CVE information to the next higher level CNA when a CVE ID is assigned and the associated vulnerability made public </a:t>
             </a:r>
           </a:p>
           <a:p>
@@ -8886,21 +9117,14 @@
             <a:pPr lvl="1"/>
             <a:r>
               <a:rPr lang="en-US" dirty="0"/>
-              <a:t>Operate under the CVE </a:t>
-            </a:r>
-            <a:r>
-              <a:rPr lang="en-US" dirty="0">
-                <a:hlinkClick r:id="rId2"/>
-              </a:rPr>
-              <a:t>Terms of Use</a:t>
-            </a:r>
-            <a:endParaRPr lang="en-US" dirty="0"/>
+              <a:t>Operate under the CVE Terms of Use</a:t>
+            </a:r>
           </a:p>
           <a:p>
             <a:pPr lvl="1"/>
             <a:r>
               <a:rPr lang="en-US" dirty="0"/>
-              <a:t>Track and provide metrics related to responsiveness to higher-level CNAs</a:t>
+              <a:t>Track and provide metrics related to responsiveness to higher level CNAs</a:t>
             </a:r>
           </a:p>
           <a:p>
@@ -8914,7 +9138,7 @@
             <a:pPr lvl="2"/>
             <a:r>
               <a:rPr lang="en-US" dirty="0"/>
-              <a:t>Metrics are provided quarterly to the next higher-level CNA </a:t>
+              <a:t>Metrics are provided quarterly to the next higher level CNA </a:t>
             </a:r>
           </a:p>
           <a:p>
@@ -8928,7 +9152,7 @@
             <a:pPr lvl="1"/>
             <a:r>
               <a:rPr lang="en-US" dirty="0"/>
-              <a:t>Provide any documentation required to adjudicate disputes to the higher-level CNA</a:t>
+              <a:t>Provide any documentation required to adjudicate disputes to the higher level CNA</a:t>
             </a:r>
           </a:p>
           <a:p>
@@ -9045,7 +9269,7 @@
           <a:p>
             <a:r>
               <a:rPr lang="en-US" dirty="0"/>
-              <a:t>In addition to following the aforementioned rules, Root CNAs must perform the following functions:</a:t>
+              <a:t>In addition to following the afore mentioned rules, Root CNAs must perform the following functions:</a:t>
             </a:r>
           </a:p>
           <a:p>
@@ -9059,7 +9283,7 @@
             <a:pPr lvl="2"/>
             <a:r>
               <a:rPr lang="en-US" dirty="0"/>
-              <a:t>Request CVE ID blocks from the Program Root CNA</a:t>
+              <a:t>Request CVE ID blocks from the Primary CNA</a:t>
             </a:r>
           </a:p>
           <a:p>
@@ -9094,21 +9318,21 @@
             <a:pPr lvl="2"/>
             <a:r>
               <a:rPr lang="en-US" dirty="0"/>
-              <a:t>Notify the Program Root CNA when Sub-CNAs are established or removed</a:t>
+              <a:t>Notify the Primary CNA when Sub-CNAs are established or removed</a:t>
             </a:r>
           </a:p>
           <a:p>
             <a:pPr lvl="2"/>
             <a:r>
               <a:rPr lang="en-US" dirty="0"/>
-              <a:t>Provide a public list of POCs and web links for each Sub-CNA in the Root CNA's domain; provide this information to the Program Root CNA</a:t>
+              <a:t>Provide a public list of POCs and web links for each Sub-CNA in the Root CNA's domain; provide this information to the Primary CNA</a:t>
             </a:r>
           </a:p>
           <a:p>
             <a:pPr lvl="2"/>
             <a:r>
               <a:rPr lang="en-US" dirty="0"/>
-              <a:t>Maintain a private list of individual POCs within each Sub-CNA for use by CNAs only; provide this information to the Program Root CNA</a:t>
+              <a:t>Maintain a private list of individual POCs within each Sub-CNA for use by CNAs only; provide this information to the Primary CNA</a:t>
             </a:r>
           </a:p>
           <a:p>
@@ -9117,6 +9341,11 @@
               <a:rPr lang="en-US" dirty="0"/>
               <a:t>Maintain a public listing of the established counting rules followed by the Root CNA and Sub-CNAs in its domain</a:t>
             </a:r>
+            <a:endParaRPr lang="en-US" sz="2000" dirty="0"/>
+          </a:p>
+          <a:p>
+            <a:pPr lvl="2"/>
+            <a:endParaRPr lang="en-US" dirty="0"/>
           </a:p>
           <a:p>
             <a:pPr lvl="2"/>
@@ -9203,9 +9432,7 @@
         </p:nvSpPr>
         <p:spPr/>
         <p:txBody>
-          <a:bodyPr>
-            <a:normAutofit lnSpcReduction="10000"/>
-          </a:bodyPr>
+          <a:bodyPr/>
           <a:lstStyle/>
           <a:p>
             <a:pPr lvl="1"/>
@@ -9225,7 +9452,7 @@
             <a:pPr lvl="2"/>
             <a:r>
               <a:rPr lang="en-US" dirty="0"/>
-              <a:t>Submit metrics from Sub-CNAs quarterly, within two weeks of the quarter, to the Program Root CNA; quarters are based on the calendar year</a:t>
+              <a:t>Submit metrics from Sub-CNAs quarterly, within two weeks of the quarter, to the Primary CNA; quarters are based on the calendar year</a:t>
             </a:r>
           </a:p>
           <a:p>
@@ -9239,29 +9466,21 @@
             <a:pPr lvl="2"/>
             <a:r>
               <a:rPr lang="en-US" dirty="0"/>
-              <a:t>When appropriate, apply sanctions upon any Sub-CNAs within its domain and notify the Program Root CNA; the application of sanctions should occur as a last resort</a:t>
+              <a:t>When appropriate, apply sanctions upon any Sub-CNAs within its domain and notify the Primary CNA; the application of sanctions should occur as a last resort</a:t>
             </a:r>
           </a:p>
           <a:p>
             <a:pPr lvl="2"/>
             <a:r>
               <a:rPr lang="en-US" dirty="0"/>
-              <a:t>Facilitate the enforcement of any administrative actions taken by the Program Root CNA against a Sub-CNA</a:t>
+              <a:t>Facilitate the enforcement of any administrative actions taken by the Primary CNA against a Sub-CNA</a:t>
             </a:r>
           </a:p>
           <a:p>
             <a:pPr lvl="2"/>
             <a:r>
               <a:rPr lang="en-US" dirty="0"/>
-              <a:t>Follow the CNA Candidate Process described in Section 4 of the </a:t>
-            </a:r>
-            <a:r>
-              <a:rPr lang="en-US" i="1" dirty="0"/>
-              <a:t>CNA Rules</a:t>
-            </a:r>
-            <a:r>
-              <a:rPr lang="en-US" dirty="0"/>
-              <a:t> when adding new Sub-CNAs</a:t>
+              <a:t>Follow the CNA Candidate Process described in Section 4 when adding new Sub-CNAs</a:t>
             </a:r>
           </a:p>
           <a:p>
@@ -9322,14 +9541,12 @@
         </p:nvSpPr>
         <p:spPr/>
         <p:txBody>
-          <a:bodyPr>
-            <a:normAutofit fontScale="90000"/>
-          </a:bodyPr>
-          <a:lstStyle/>
-          <a:p>
-            <a:r>
-              <a:rPr lang="en-US" dirty="0"/>
-              <a:t>Additional Program Root CNA Rules (1 of 2)</a:t>
+          <a:bodyPr/>
+          <a:lstStyle/>
+          <a:p>
+            <a:r>
+              <a:rPr lang="en-US" dirty="0"/>
+              <a:t>Additional Primary CNA Rules (1 of 2)</a:t>
             </a:r>
           </a:p>
         </p:txBody>
@@ -9359,7 +9576,7 @@
           <a:p>
             <a:r>
               <a:rPr lang="en-US" dirty="0"/>
-              <a:t>In addition to following the afore mentioned rules, the Program Root CNA must perform the following functions:</a:t>
+              <a:t>In addition to following the afore mentioned rules, the Primary CNA must perform the following functions:</a:t>
             </a:r>
           </a:p>
           <a:p>
@@ -9493,14 +9710,12 @@
         </p:nvSpPr>
         <p:spPr/>
         <p:txBody>
-          <a:bodyPr>
-            <a:normAutofit fontScale="90000"/>
-          </a:bodyPr>
-          <a:lstStyle/>
-          <a:p>
-            <a:r>
-              <a:rPr lang="en-US" dirty="0"/>
-              <a:t>Additional Program Root CNA Rules (2 of 2)</a:t>
+          <a:bodyPr/>
+          <a:lstStyle/>
+          <a:p>
+            <a:r>
+              <a:rPr lang="en-US" dirty="0"/>
+              <a:t>Additional Primary CNA Rules (2 of 2)</a:t>
             </a:r>
           </a:p>
         </p:txBody>
@@ -9570,16 +9785,12 @@
             <a:pPr lvl="1"/>
             <a:r>
               <a:rPr lang="en-US" dirty="0"/>
-              <a:t>Follow the CNA Candidate Process described in Section 4 of the </a:t>
-            </a:r>
-            <a:r>
-              <a:rPr lang="en-US" i="1" dirty="0"/>
-              <a:t>CNA Rules </a:t>
-            </a:r>
-            <a:r>
-              <a:rPr lang="en-US" dirty="0"/>
-              <a:t>when adding new Root CNAs</a:t>
-            </a:r>
+              <a:t>Follow the CNA Candidate Process described in Section 4 when adding new Root CNAs</a:t>
+            </a:r>
+          </a:p>
+          <a:p>
+            <a:pPr lvl="1"/>
+            <a:endParaRPr lang="en-US" dirty="0"/>
           </a:p>
           <a:p>
             <a:pPr lvl="1"/>
@@ -9678,7 +9889,7 @@
             <a:pPr lvl="1"/>
             <a:r>
               <a:rPr lang="en-US" dirty="0"/>
-              <a:t>CNAs help to address the CVE Program's primary challenge to satisfy the demand for timely, accurate CVE ID assignments while rapidly expanding the scope of coverage to address the increasing number of vulnerabilities and evolving state of vulnerability management. </a:t>
+              <a:t>CNAs help to address the CVE Program's primary challenge to satisfy the demand for timely, accurate CVE assignments while rapidly expanding the scope of coverage to address the increasing number of vulnerabilities and evolving state of vulnerability management. </a:t>
             </a:r>
           </a:p>
           <a:p>
@@ -9810,7 +10021,7 @@
             </a:pPr>
             <a:r>
               <a:rPr lang="en-US" dirty="0"/>
-              <a:t>For situations where CVE ID assignment decisions are disputed, or where there is a disagreement between Root CNAs or between a Root CNA and one of their Sub-CNAs, the following process should be followed to resolve the issues:</a:t>
+              <a:t>For situations where CVE assignment decisions are disputed, or where there is a disagreement between Root CNAs or between a Root CNA and one of their Sub-CNAs, the following process should be followed to resolve the issues:</a:t>
             </a:r>
           </a:p>
           <a:p>
@@ -9821,7 +10032,7 @@
             </a:pPr>
             <a:r>
               <a:rPr lang="en-US" dirty="0"/>
-              <a:t>The party seeking to appeal a decision made by a Root CNA, or resolve a disagreement between Root CNAs, contacts the Program Root CNA at </a:t>
+              <a:t>The party seeking to appeal a decision made by a Root CNA, or resolve a disagreement between Root CNAs, contacts the Primary CNA at </a:t>
             </a:r>
             <a:r>
               <a:rPr lang="en-US" u="sng" dirty="0">
@@ -9842,7 +10053,7 @@
             </a:pPr>
             <a:r>
               <a:rPr lang="en-US" dirty="0"/>
-              <a:t>The Program Root CNA sets expectations for when a timely resolution may be available; appeals of time-sensitive issues are prioritized, as determined by the Program Root CNA</a:t>
+              <a:t>The Primary CNA sets expectations for when a timely resolution may be available; appeals of time-sensitive issues are prioritized, as determined by the Primary CNA</a:t>
             </a:r>
           </a:p>
           <a:p>
@@ -9853,15 +10064,7 @@
             </a:pPr>
             <a:r>
               <a:rPr lang="en-US" dirty="0"/>
-              <a:t>The Program Root CNA contacts the appropriate entities to collect information relevant to the issue. The CNAs involved in the dispute provide documentation per the rules established in the </a:t>
-            </a:r>
-            <a:r>
-              <a:rPr lang="en-US" i="1" dirty="0"/>
-              <a:t>CNA Rules</a:t>
-            </a:r>
-            <a:r>
-              <a:rPr lang="en-US" dirty="0"/>
-              <a:t>. The Program Root CNA may also engage the CVE Board for their consideration of the issue</a:t>
+              <a:t>The Primary CNA contacts the appropriate entities to collect information relevant to the issue. The CNAs involved in the dispute provide documentation per the rules established in this document. The Primary CNA may also engage the CVE Board for their consideration of the issue</a:t>
             </a:r>
           </a:p>
           <a:p>
@@ -9872,7 +10075,7 @@
             </a:pPr>
             <a:r>
               <a:rPr lang="en-US" dirty="0"/>
-              <a:t>The Program Root CNA communicates its decision to all relevant parties once the disagreement or appeal has been fully considered; this result is final</a:t>
+              <a:t>The Primary CNA communicates its decision to all relevant parties once the disagreement or appeal has been fully considered; this result is final</a:t>
             </a:r>
           </a:p>
           <a:p>
@@ -10162,11 +10365,7 @@
             </a:pPr>
             <a:r>
               <a:rPr lang="en-US" dirty="0"/>
-              <a:t>Willing to follow </a:t>
-            </a:r>
-            <a:r>
-              <a:rPr lang="en-US" i="1" dirty="0"/>
-              <a:t>CNA Rules</a:t>
+              <a:t>Willing to follow CNA rules</a:t>
             </a:r>
           </a:p>
           <a:p>
@@ -10304,11 +10503,7 @@
           <a:p>
             <a:r>
               <a:rPr lang="en-US" dirty="0"/>
-              <a:t>You are expected to put in the time and effort to implement the </a:t>
-            </a:r>
-            <a:r>
-              <a:rPr lang="en-US" i="1" dirty="0"/>
-              <a:t>CNA Rules</a:t>
+              <a:t>You are expected to put in the time and effort to implement the CNA Rules</a:t>
             </a:r>
           </a:p>
           <a:p>
@@ -10417,7 +10612,7 @@
           <a:p>
             <a:r>
               <a:rPr lang="en-US" dirty="0"/>
-              <a:t>If you are not sure, contact the CVE Program Root CNA:</a:t>
+              <a:t>If you are not sure, contact MITRE:</a:t>
             </a:r>
           </a:p>
           <a:p>
@@ -10449,14 +10644,8 @@
           <a:p>
             <a:pPr lvl="1"/>
             <a:r>
-              <a:rPr lang="en-US" dirty="0">
-                <a:hlinkClick r:id="rId4"/>
-              </a:rPr>
-              <a:t>https://cve.mitre.org/cve/request_id.html#cna_coverage.html</a:t>
-            </a:r>
-            <a:r>
-              <a:rPr lang="en-US" dirty="0"/>
-              <a:t> </a:t>
+              <a:rPr lang="en-US" dirty="0"/>
+              <a:t>http://cve.mitre.org/cve/request_id.html#cna_coverage.html</a:t>
             </a:r>
           </a:p>
         </p:txBody>
@@ -11358,13 +11547,13 @@
 <file path=customXml/itemProps3.xml><?xml version="1.0" encoding="utf-8"?>
 <ds:datastoreItem xmlns:ds="http://schemas.openxmlformats.org/officeDocument/2006/customXml" ds:itemID="{760E1BCA-B7C8-4D5D-A2B9-87067345F3DD}">
   <ds:schemaRefs>
+    <ds:schemaRef ds:uri="http://purl.org/dc/elements/1.1/"/>
+    <ds:schemaRef ds:uri="http://schemas.microsoft.com/office/2006/metadata/properties"/>
+    <ds:schemaRef ds:uri="http://schemas.microsoft.com/sharepoint/v3"/>
     <ds:schemaRef ds:uri="http://purl.org/dc/terms/"/>
     <ds:schemaRef ds:uri="http://schemas.openxmlformats.org/package/2006/metadata/core-properties"/>
     <ds:schemaRef ds:uri="http://schemas.microsoft.com/office/2006/documentManagement/types"/>
     <ds:schemaRef ds:uri="http://schemas.microsoft.com/office/infopath/2007/PartnerControls"/>
-    <ds:schemaRef ds:uri="http://purl.org/dc/elements/1.1/"/>
-    <ds:schemaRef ds:uri="http://schemas.microsoft.com/office/2006/metadata/properties"/>
-    <ds:schemaRef ds:uri="http://schemas.microsoft.com/sharepoint/v3"/>
     <ds:schemaRef ds:uri="http://schemas.microsoft.com/sharepoint/v3/fields"/>
     <ds:schemaRef ds:uri="http://www.w3.org/XML/1998/namespace"/>
     <ds:schemaRef ds:uri="http://purl.org/dc/dcmitype/"/>

</xml_diff>